<commit_message>
HBILL-1402: minor readme improvements
</commit_message>
<xml_diff>
--- a/local_environment/assets/local_env_arch.pptx
+++ b/local_environment/assets/local_env_arch.pptx
@@ -6,7 +6,6 @@
   </p:sldMasterIdLst>
   <p:sldIdLst>
     <p:sldId id="256" r:id="rId2"/>
-    <p:sldId id="257" r:id="rId3"/>
   </p:sldIdLst>
   <p:sldSz cx="12192000" cy="6858000"/>
   <p:notesSz cx="6858000" cy="9144000"/>
@@ -4822,1525 +4821,6 @@
 </p:sld>
 </file>
 
-<file path=ppt/slides/slide2.xml><?xml version="1.0" encoding="utf-8"?>
-<p:sld xmlns:a="http://schemas.openxmlformats.org/drawingml/2006/main" xmlns:r="http://schemas.openxmlformats.org/officeDocument/2006/relationships" xmlns:p="http://schemas.openxmlformats.org/presentationml/2006/main">
-  <p:cSld>
-    <p:spTree>
-      <p:nvGrpSpPr>
-        <p:cNvPr id="1" name=""/>
-        <p:cNvGrpSpPr/>
-        <p:nvPr/>
-      </p:nvGrpSpPr>
-      <p:grpSpPr>
-        <a:xfrm>
-          <a:off x="0" y="0"/>
-          <a:ext cx="0" cy="0"/>
-          <a:chOff x="0" y="0"/>
-          <a:chExt cx="0" cy="0"/>
-        </a:xfrm>
-      </p:grpSpPr>
-      <p:sp>
-        <p:nvSpPr>
-          <p:cNvPr id="29" name="Rounded Rectangle 28">
-            <a:extLst>
-              <a:ext uri="{FF2B5EF4-FFF2-40B4-BE49-F238E27FC236}">
-                <a16:creationId xmlns:a16="http://schemas.microsoft.com/office/drawing/2014/main" id="{E2A4FDBE-5F16-E844-B19E-F7DA4DA01B93}"/>
-              </a:ext>
-            </a:extLst>
-          </p:cNvPr>
-          <p:cNvSpPr/>
-          <p:nvPr/>
-        </p:nvSpPr>
-        <p:spPr>
-          <a:xfrm>
-            <a:off x="8169846" y="3260594"/>
-            <a:ext cx="1558803" cy="3257550"/>
-          </a:xfrm>
-          <a:prstGeom prst="roundRect">
-            <a:avLst/>
-          </a:prstGeom>
-          <a:solidFill>
-            <a:schemeClr val="bg1">
-              <a:lumMod val="95000"/>
-            </a:schemeClr>
-          </a:solidFill>
-          <a:ln w="25400">
-            <a:solidFill>
-              <a:schemeClr val="bg1">
-                <a:lumMod val="75000"/>
-              </a:schemeClr>
-            </a:solidFill>
-          </a:ln>
-        </p:spPr>
-        <p:style>
-          <a:lnRef idx="2">
-            <a:schemeClr val="accent1">
-              <a:shade val="50000"/>
-            </a:schemeClr>
-          </a:lnRef>
-          <a:fillRef idx="1">
-            <a:schemeClr val="accent1"/>
-          </a:fillRef>
-          <a:effectRef idx="0">
-            <a:schemeClr val="accent1"/>
-          </a:effectRef>
-          <a:fontRef idx="minor">
-            <a:schemeClr val="lt1"/>
-          </a:fontRef>
-        </p:style>
-        <p:txBody>
-          <a:bodyPr rtlCol="0" anchor="t"/>
-          <a:lstStyle/>
-          <a:p>
-            <a:pPr algn="ctr"/>
-            <a:r>
-              <a:rPr lang="en-US" b="1" dirty="0">
-                <a:solidFill>
-                  <a:schemeClr val="tx1"/>
-                </a:solidFill>
-              </a:rPr>
-              <a:t>LOCAL</a:t>
-            </a:r>
-            <a:endParaRPr lang="it-IT" b="1" dirty="0">
-              <a:solidFill>
-                <a:schemeClr val="tx1"/>
-              </a:solidFill>
-            </a:endParaRPr>
-          </a:p>
-        </p:txBody>
-      </p:sp>
-      <p:pic>
-        <p:nvPicPr>
-          <p:cNvPr id="5" name="Picture 4">
-            <a:extLst>
-              <a:ext uri="{FF2B5EF4-FFF2-40B4-BE49-F238E27FC236}">
-                <a16:creationId xmlns:a16="http://schemas.microsoft.com/office/drawing/2014/main" id="{3F5B94D2-F2F0-744D-A37B-066F633FC3BD}"/>
-              </a:ext>
-            </a:extLst>
-          </p:cNvPr>
-          <p:cNvPicPr>
-            <a:picLocks noChangeAspect="1"/>
-          </p:cNvPicPr>
-          <p:nvPr/>
-        </p:nvPicPr>
-        <p:blipFill rotWithShape="1">
-          <a:blip r:embed="rId2"/>
-          <a:srcRect r="32515"/>
-          <a:stretch/>
-        </p:blipFill>
-        <p:spPr>
-          <a:xfrm>
-            <a:off x="240757" y="2426503"/>
-            <a:ext cx="2119854" cy="2169318"/>
-          </a:xfrm>
-          <a:prstGeom prst="rect">
-            <a:avLst/>
-          </a:prstGeom>
-          <a:ln>
-            <a:solidFill>
-              <a:schemeClr val="tx1"/>
-            </a:solidFill>
-          </a:ln>
-        </p:spPr>
-      </p:pic>
-      <p:sp>
-        <p:nvSpPr>
-          <p:cNvPr id="7" name="Rounded Rectangle 6">
-            <a:extLst>
-              <a:ext uri="{FF2B5EF4-FFF2-40B4-BE49-F238E27FC236}">
-                <a16:creationId xmlns:a16="http://schemas.microsoft.com/office/drawing/2014/main" id="{2D1BEBAF-98F4-504F-B3F0-D70FADC62F18}"/>
-              </a:ext>
-            </a:extLst>
-          </p:cNvPr>
-          <p:cNvSpPr/>
-          <p:nvPr/>
-        </p:nvSpPr>
-        <p:spPr>
-          <a:xfrm>
-            <a:off x="3346273" y="789384"/>
-            <a:ext cx="3939302" cy="4702953"/>
-          </a:xfrm>
-          <a:prstGeom prst="roundRect">
-            <a:avLst>
-              <a:gd name="adj" fmla="val 7732"/>
-            </a:avLst>
-          </a:prstGeom>
-          <a:solidFill>
-            <a:schemeClr val="accent5">
-              <a:lumMod val="20000"/>
-              <a:lumOff val="80000"/>
-              <a:alpha val="20000"/>
-            </a:schemeClr>
-          </a:solidFill>
-          <a:ln w="25400">
-            <a:solidFill>
-              <a:schemeClr val="accent5">
-                <a:lumMod val="60000"/>
-                <a:lumOff val="40000"/>
-              </a:schemeClr>
-            </a:solidFill>
-          </a:ln>
-        </p:spPr>
-        <p:style>
-          <a:lnRef idx="2">
-            <a:schemeClr val="accent1">
-              <a:shade val="50000"/>
-            </a:schemeClr>
-          </a:lnRef>
-          <a:fillRef idx="1">
-            <a:schemeClr val="accent1"/>
-          </a:fillRef>
-          <a:effectRef idx="0">
-            <a:schemeClr val="accent1"/>
-          </a:effectRef>
-          <a:fontRef idx="minor">
-            <a:schemeClr val="lt1"/>
-          </a:fontRef>
-        </p:style>
-        <p:txBody>
-          <a:bodyPr rtlCol="0" anchor="t"/>
-          <a:lstStyle/>
-          <a:p>
-            <a:pPr algn="ctr"/>
-            <a:r>
-              <a:rPr lang="en-US" b="1" dirty="0">
-                <a:solidFill>
-                  <a:schemeClr val="tx1"/>
-                </a:solidFill>
-              </a:rPr>
-              <a:t>DOCKER@LOCAL</a:t>
-            </a:r>
-            <a:endParaRPr lang="it-IT" b="1" dirty="0">
-              <a:solidFill>
-                <a:schemeClr val="tx1"/>
-              </a:solidFill>
-            </a:endParaRPr>
-          </a:p>
-        </p:txBody>
-      </p:sp>
-      <p:sp>
-        <p:nvSpPr>
-          <p:cNvPr id="8" name="Rounded Rectangle 7">
-            <a:extLst>
-              <a:ext uri="{FF2B5EF4-FFF2-40B4-BE49-F238E27FC236}">
-                <a16:creationId xmlns:a16="http://schemas.microsoft.com/office/drawing/2014/main" id="{EA0CF736-762C-984C-B232-97D87C0C2985}"/>
-              </a:ext>
-            </a:extLst>
-          </p:cNvPr>
-          <p:cNvSpPr/>
-          <p:nvPr/>
-        </p:nvSpPr>
-        <p:spPr>
-          <a:xfrm>
-            <a:off x="5351881" y="1751010"/>
-            <a:ext cx="1734755" cy="3409233"/>
-          </a:xfrm>
-          <a:prstGeom prst="roundRect">
-            <a:avLst/>
-          </a:prstGeom>
-          <a:solidFill>
-            <a:schemeClr val="accent6">
-              <a:lumMod val="20000"/>
-              <a:lumOff val="80000"/>
-            </a:schemeClr>
-          </a:solidFill>
-          <a:ln w="25400">
-            <a:solidFill>
-              <a:schemeClr val="accent6">
-                <a:lumMod val="60000"/>
-                <a:lumOff val="40000"/>
-              </a:schemeClr>
-            </a:solidFill>
-          </a:ln>
-        </p:spPr>
-        <p:style>
-          <a:lnRef idx="2">
-            <a:schemeClr val="accent1">
-              <a:shade val="50000"/>
-            </a:schemeClr>
-          </a:lnRef>
-          <a:fillRef idx="1">
-            <a:schemeClr val="accent1"/>
-          </a:fillRef>
-          <a:effectRef idx="0">
-            <a:schemeClr val="accent1"/>
-          </a:effectRef>
-          <a:fontRef idx="minor">
-            <a:schemeClr val="lt1"/>
-          </a:fontRef>
-        </p:style>
-        <p:txBody>
-          <a:bodyPr rtlCol="0" anchor="b"/>
-          <a:lstStyle/>
-          <a:p>
-            <a:pPr algn="ctr"/>
-            <a:r>
-              <a:rPr lang="en-US" dirty="0">
-                <a:solidFill>
-                  <a:schemeClr val="tx1"/>
-                </a:solidFill>
-              </a:rPr>
-              <a:t>STYX</a:t>
-            </a:r>
-            <a:endParaRPr lang="it-IT" dirty="0">
-              <a:solidFill>
-                <a:schemeClr val="tx1"/>
-              </a:solidFill>
-            </a:endParaRPr>
-          </a:p>
-        </p:txBody>
-      </p:sp>
-      <p:sp>
-        <p:nvSpPr>
-          <p:cNvPr id="9" name="Rounded Rectangle 8">
-            <a:extLst>
-              <a:ext uri="{FF2B5EF4-FFF2-40B4-BE49-F238E27FC236}">
-                <a16:creationId xmlns:a16="http://schemas.microsoft.com/office/drawing/2014/main" id="{408484A1-420D-7C47-B660-191164F1DF6B}"/>
-              </a:ext>
-            </a:extLst>
-          </p:cNvPr>
-          <p:cNvSpPr/>
-          <p:nvPr/>
-        </p:nvSpPr>
-        <p:spPr>
-          <a:xfrm>
-            <a:off x="5602951" y="2234786"/>
-            <a:ext cx="1323295" cy="2081663"/>
-          </a:xfrm>
-          <a:prstGeom prst="roundRect">
-            <a:avLst/>
-          </a:prstGeom>
-          <a:solidFill>
-            <a:schemeClr val="accent5">
-              <a:lumMod val="20000"/>
-              <a:lumOff val="80000"/>
-            </a:schemeClr>
-          </a:solidFill>
-          <a:ln w="25400">
-            <a:solidFill>
-              <a:schemeClr val="accent1">
-                <a:lumMod val="60000"/>
-                <a:lumOff val="40000"/>
-              </a:schemeClr>
-            </a:solidFill>
-          </a:ln>
-        </p:spPr>
-        <p:style>
-          <a:lnRef idx="2">
-            <a:schemeClr val="accent1">
-              <a:shade val="50000"/>
-            </a:schemeClr>
-          </a:lnRef>
-          <a:fillRef idx="1">
-            <a:schemeClr val="accent1"/>
-          </a:fillRef>
-          <a:effectRef idx="0">
-            <a:schemeClr val="accent1"/>
-          </a:effectRef>
-          <a:fontRef idx="minor">
-            <a:schemeClr val="lt1"/>
-          </a:fontRef>
-        </p:style>
-        <p:txBody>
-          <a:bodyPr rtlCol="0" anchor="ctr"/>
-          <a:lstStyle/>
-          <a:p>
-            <a:pPr algn="ctr"/>
-            <a:r>
-              <a:rPr lang="en-US" dirty="0">
-                <a:solidFill>
-                  <a:schemeClr val="tx1"/>
-                </a:solidFill>
-              </a:rPr>
-              <a:t>DIONYSUSSTYX PLUGIN</a:t>
-            </a:r>
-            <a:endParaRPr lang="it-IT" dirty="0">
-              <a:solidFill>
-                <a:schemeClr val="tx1"/>
-              </a:solidFill>
-            </a:endParaRPr>
-          </a:p>
-        </p:txBody>
-      </p:sp>
-      <p:sp>
-        <p:nvSpPr>
-          <p:cNvPr id="10" name="Rounded Rectangle 9">
-            <a:extLst>
-              <a:ext uri="{FF2B5EF4-FFF2-40B4-BE49-F238E27FC236}">
-                <a16:creationId xmlns:a16="http://schemas.microsoft.com/office/drawing/2014/main" id="{D7AD22DD-3607-1A49-964E-90D9DA4553D7}"/>
-              </a:ext>
-            </a:extLst>
-          </p:cNvPr>
-          <p:cNvSpPr/>
-          <p:nvPr/>
-        </p:nvSpPr>
-        <p:spPr>
-          <a:xfrm>
-            <a:off x="8345074" y="5492337"/>
-            <a:ext cx="1265441" cy="785834"/>
-          </a:xfrm>
-          <a:prstGeom prst="roundRect">
-            <a:avLst/>
-          </a:prstGeom>
-          <a:solidFill>
-            <a:srgbClr val="FF0000">
-              <a:alpha val="20000"/>
-            </a:srgbClr>
-          </a:solidFill>
-          <a:ln w="25400">
-            <a:solidFill>
-              <a:srgbClr val="FF0000"/>
-            </a:solidFill>
-          </a:ln>
-        </p:spPr>
-        <p:style>
-          <a:lnRef idx="2">
-            <a:schemeClr val="accent1">
-              <a:shade val="50000"/>
-            </a:schemeClr>
-          </a:lnRef>
-          <a:fillRef idx="1">
-            <a:schemeClr val="accent1"/>
-          </a:fillRef>
-          <a:effectRef idx="0">
-            <a:schemeClr val="accent1"/>
-          </a:effectRef>
-          <a:fontRef idx="minor">
-            <a:schemeClr val="lt1"/>
-          </a:fontRef>
-        </p:style>
-        <p:txBody>
-          <a:bodyPr rtlCol="0" anchor="ctr"/>
-          <a:lstStyle/>
-          <a:p>
-            <a:pPr algn="ctr"/>
-            <a:r>
-              <a:rPr lang="en-US" dirty="0">
-                <a:solidFill>
-                  <a:schemeClr val="tx1"/>
-                </a:solidFill>
-              </a:rPr>
-              <a:t>CHECKITO</a:t>
-            </a:r>
-            <a:endParaRPr lang="it-IT" dirty="0">
-              <a:solidFill>
-                <a:schemeClr val="tx1"/>
-              </a:solidFill>
-            </a:endParaRPr>
-          </a:p>
-        </p:txBody>
-      </p:sp>
-      <p:sp>
-        <p:nvSpPr>
-          <p:cNvPr id="11" name="Rounded Rectangle 10">
-            <a:extLst>
-              <a:ext uri="{FF2B5EF4-FFF2-40B4-BE49-F238E27FC236}">
-                <a16:creationId xmlns:a16="http://schemas.microsoft.com/office/drawing/2014/main" id="{B3432DC2-2BDF-694B-9115-66803DD30B41}"/>
-              </a:ext>
-            </a:extLst>
-          </p:cNvPr>
-          <p:cNvSpPr/>
-          <p:nvPr/>
-        </p:nvSpPr>
-        <p:spPr>
-          <a:xfrm>
-            <a:off x="8325480" y="4067749"/>
-            <a:ext cx="1265441" cy="755096"/>
-          </a:xfrm>
-          <a:prstGeom prst="roundRect">
-            <a:avLst/>
-          </a:prstGeom>
-          <a:solidFill>
-            <a:srgbClr val="FF0000">
-              <a:alpha val="20000"/>
-            </a:srgbClr>
-          </a:solidFill>
-          <a:ln w="25400">
-            <a:solidFill>
-              <a:srgbClr val="FF0000"/>
-            </a:solidFill>
-          </a:ln>
-        </p:spPr>
-        <p:style>
-          <a:lnRef idx="2">
-            <a:schemeClr val="accent1">
-              <a:shade val="50000"/>
-            </a:schemeClr>
-          </a:lnRef>
-          <a:fillRef idx="1">
-            <a:schemeClr val="accent1"/>
-          </a:fillRef>
-          <a:effectRef idx="0">
-            <a:schemeClr val="accent1"/>
-          </a:effectRef>
-          <a:fontRef idx="minor">
-            <a:schemeClr val="lt1"/>
-          </a:fontRef>
-        </p:style>
-        <p:txBody>
-          <a:bodyPr rtlCol="0" anchor="ctr"/>
-          <a:lstStyle/>
-          <a:p>
-            <a:pPr algn="ctr"/>
-            <a:r>
-              <a:rPr lang="en-US" dirty="0">
-                <a:solidFill>
-                  <a:schemeClr val="tx1"/>
-                </a:solidFill>
-              </a:rPr>
-              <a:t>BA</a:t>
-            </a:r>
-            <a:endParaRPr lang="it-IT" dirty="0">
-              <a:solidFill>
-                <a:schemeClr val="tx1"/>
-              </a:solidFill>
-            </a:endParaRPr>
-          </a:p>
-        </p:txBody>
-      </p:sp>
-      <p:sp>
-        <p:nvSpPr>
-          <p:cNvPr id="12" name="Rounded Rectangle 11">
-            <a:extLst>
-              <a:ext uri="{FF2B5EF4-FFF2-40B4-BE49-F238E27FC236}">
-                <a16:creationId xmlns:a16="http://schemas.microsoft.com/office/drawing/2014/main" id="{018BB6F3-4C3E-9947-AACC-BB833FE4D00D}"/>
-              </a:ext>
-            </a:extLst>
-          </p:cNvPr>
-          <p:cNvSpPr/>
-          <p:nvPr/>
-        </p:nvSpPr>
-        <p:spPr>
-          <a:xfrm>
-            <a:off x="3591132" y="1751010"/>
-            <a:ext cx="945656" cy="3409233"/>
-          </a:xfrm>
-          <a:prstGeom prst="roundRect">
-            <a:avLst/>
-          </a:prstGeom>
-          <a:solidFill>
-            <a:schemeClr val="accent6">
-              <a:lumMod val="20000"/>
-              <a:lumOff val="80000"/>
-            </a:schemeClr>
-          </a:solidFill>
-          <a:ln w="25400">
-            <a:solidFill>
-              <a:schemeClr val="accent6">
-                <a:lumMod val="60000"/>
-                <a:lumOff val="40000"/>
-              </a:schemeClr>
-            </a:solidFill>
-          </a:ln>
-        </p:spPr>
-        <p:style>
-          <a:lnRef idx="2">
-            <a:schemeClr val="accent1">
-              <a:shade val="50000"/>
-            </a:schemeClr>
-          </a:lnRef>
-          <a:fillRef idx="1">
-            <a:schemeClr val="accent1"/>
-          </a:fillRef>
-          <a:effectRef idx="0">
-            <a:schemeClr val="accent1"/>
-          </a:effectRef>
-          <a:fontRef idx="minor">
-            <a:schemeClr val="lt1"/>
-          </a:fontRef>
-        </p:style>
-        <p:txBody>
-          <a:bodyPr rtlCol="0" anchor="ctr"/>
-          <a:lstStyle/>
-          <a:p>
-            <a:pPr algn="ctr"/>
-            <a:r>
-              <a:rPr lang="en-US" dirty="0">
-                <a:solidFill>
-                  <a:schemeClr val="tx1"/>
-                </a:solidFill>
-              </a:rPr>
-              <a:t>NGNIX</a:t>
-            </a:r>
-            <a:endParaRPr lang="it-IT" dirty="0">
-              <a:solidFill>
-                <a:schemeClr val="tx1"/>
-              </a:solidFill>
-            </a:endParaRPr>
-          </a:p>
-        </p:txBody>
-      </p:sp>
-      <p:sp>
-        <p:nvSpPr>
-          <p:cNvPr id="13" name="Rounded Rectangle 12">
-            <a:extLst>
-              <a:ext uri="{FF2B5EF4-FFF2-40B4-BE49-F238E27FC236}">
-                <a16:creationId xmlns:a16="http://schemas.microsoft.com/office/drawing/2014/main" id="{16F77CBC-6F58-7A46-B225-7D4851146257}"/>
-              </a:ext>
-            </a:extLst>
-          </p:cNvPr>
-          <p:cNvSpPr/>
-          <p:nvPr/>
-        </p:nvSpPr>
-        <p:spPr>
-          <a:xfrm>
-            <a:off x="10473904" y="789384"/>
-            <a:ext cx="1458343" cy="5286376"/>
-          </a:xfrm>
-          <a:prstGeom prst="roundRect">
-            <a:avLst/>
-          </a:prstGeom>
-          <a:solidFill>
-            <a:schemeClr val="bg1">
-              <a:lumMod val="95000"/>
-            </a:schemeClr>
-          </a:solidFill>
-          <a:ln w="25400">
-            <a:solidFill>
-              <a:schemeClr val="bg1">
-                <a:lumMod val="75000"/>
-              </a:schemeClr>
-            </a:solidFill>
-          </a:ln>
-        </p:spPr>
-        <p:style>
-          <a:lnRef idx="2">
-            <a:schemeClr val="accent1">
-              <a:shade val="50000"/>
-            </a:schemeClr>
-          </a:lnRef>
-          <a:fillRef idx="1">
-            <a:schemeClr val="accent1"/>
-          </a:fillRef>
-          <a:effectRef idx="0">
-            <a:schemeClr val="accent1"/>
-          </a:effectRef>
-          <a:fontRef idx="minor">
-            <a:schemeClr val="lt1"/>
-          </a:fontRef>
-        </p:style>
-        <p:txBody>
-          <a:bodyPr rtlCol="0" anchor="t"/>
-          <a:lstStyle/>
-          <a:p>
-            <a:pPr algn="ctr"/>
-            <a:r>
-              <a:rPr lang="en-US" b="1" dirty="0">
-                <a:solidFill>
-                  <a:schemeClr val="tx1"/>
-                </a:solidFill>
-              </a:rPr>
-              <a:t>STAGING</a:t>
-            </a:r>
-            <a:endParaRPr lang="it-IT" b="1" dirty="0">
-              <a:solidFill>
-                <a:schemeClr val="tx1"/>
-              </a:solidFill>
-            </a:endParaRPr>
-          </a:p>
-        </p:txBody>
-      </p:sp>
-      <p:cxnSp>
-        <p:nvCxnSpPr>
-          <p:cNvPr id="17" name="Straight Connector 16">
-            <a:extLst>
-              <a:ext uri="{FF2B5EF4-FFF2-40B4-BE49-F238E27FC236}">
-                <a16:creationId xmlns:a16="http://schemas.microsoft.com/office/drawing/2014/main" id="{3D18097F-B954-9C4F-A911-7F6FADF82F9A}"/>
-              </a:ext>
-            </a:extLst>
-          </p:cNvPr>
-          <p:cNvCxnSpPr>
-            <a:cxnSpLocks/>
-            <a:stCxn id="9" idx="3"/>
-            <a:endCxn id="11" idx="1"/>
-          </p:cNvCxnSpPr>
-          <p:nvPr/>
-        </p:nvCxnSpPr>
-        <p:spPr>
-          <a:xfrm>
-            <a:off x="6926246" y="3275618"/>
-            <a:ext cx="1399234" cy="1169679"/>
-          </a:xfrm>
-          <a:prstGeom prst="line">
-            <a:avLst/>
-          </a:prstGeom>
-          <a:ln>
-            <a:solidFill>
-              <a:schemeClr val="tx1"/>
-            </a:solidFill>
-            <a:headEnd type="triangle" w="lg" len="lg"/>
-            <a:tailEnd type="triangle" w="lg" len="lg"/>
-          </a:ln>
-        </p:spPr>
-        <p:style>
-          <a:lnRef idx="1">
-            <a:schemeClr val="accent1"/>
-          </a:lnRef>
-          <a:fillRef idx="0">
-            <a:schemeClr val="accent1"/>
-          </a:fillRef>
-          <a:effectRef idx="0">
-            <a:schemeClr val="accent1"/>
-          </a:effectRef>
-          <a:fontRef idx="minor">
-            <a:schemeClr val="tx1"/>
-          </a:fontRef>
-        </p:style>
-      </p:cxnSp>
-      <p:sp>
-        <p:nvSpPr>
-          <p:cNvPr id="19" name="Rounded Rectangle 18">
-            <a:extLst>
-              <a:ext uri="{FF2B5EF4-FFF2-40B4-BE49-F238E27FC236}">
-                <a16:creationId xmlns:a16="http://schemas.microsoft.com/office/drawing/2014/main" id="{78988F75-6A52-EA47-9818-46EA9CF27CF9}"/>
-              </a:ext>
-            </a:extLst>
-          </p:cNvPr>
-          <p:cNvSpPr/>
-          <p:nvPr/>
-        </p:nvSpPr>
-        <p:spPr>
-          <a:xfrm>
-            <a:off x="10682455" y="2330261"/>
-            <a:ext cx="1041235" cy="732372"/>
-          </a:xfrm>
-          <a:prstGeom prst="roundRect">
-            <a:avLst/>
-          </a:prstGeom>
-          <a:solidFill>
-            <a:schemeClr val="bg2">
-              <a:lumMod val="90000"/>
-            </a:schemeClr>
-          </a:solidFill>
-          <a:ln w="25400">
-            <a:solidFill>
-              <a:schemeClr val="bg2">
-                <a:lumMod val="50000"/>
-              </a:schemeClr>
-            </a:solidFill>
-          </a:ln>
-        </p:spPr>
-        <p:style>
-          <a:lnRef idx="2">
-            <a:schemeClr val="accent1">
-              <a:shade val="50000"/>
-            </a:schemeClr>
-          </a:lnRef>
-          <a:fillRef idx="1">
-            <a:schemeClr val="accent1"/>
-          </a:fillRef>
-          <a:effectRef idx="0">
-            <a:schemeClr val="accent1"/>
-          </a:effectRef>
-          <a:fontRef idx="minor">
-            <a:schemeClr val="lt1"/>
-          </a:fontRef>
-        </p:style>
-        <p:txBody>
-          <a:bodyPr rtlCol="0" anchor="ctr"/>
-          <a:lstStyle/>
-          <a:p>
-            <a:pPr algn="ctr"/>
-            <a:r>
-              <a:rPr lang="en-US" dirty="0">
-                <a:solidFill>
-                  <a:schemeClr val="tx1"/>
-                </a:solidFill>
-              </a:rPr>
-              <a:t>DA</a:t>
-            </a:r>
-            <a:endParaRPr lang="it-IT" dirty="0">
-              <a:solidFill>
-                <a:schemeClr val="tx1"/>
-              </a:solidFill>
-            </a:endParaRPr>
-          </a:p>
-        </p:txBody>
-      </p:sp>
-      <p:cxnSp>
-        <p:nvCxnSpPr>
-          <p:cNvPr id="28" name="Straight Connector 27">
-            <a:extLst>
-              <a:ext uri="{FF2B5EF4-FFF2-40B4-BE49-F238E27FC236}">
-                <a16:creationId xmlns:a16="http://schemas.microsoft.com/office/drawing/2014/main" id="{843BAC9C-DAB2-5F41-B468-90952ED511CE}"/>
-              </a:ext>
-            </a:extLst>
-          </p:cNvPr>
-          <p:cNvCxnSpPr>
-            <a:cxnSpLocks/>
-            <a:stCxn id="11" idx="2"/>
-            <a:endCxn id="10" idx="0"/>
-          </p:cNvCxnSpPr>
-          <p:nvPr/>
-        </p:nvCxnSpPr>
-        <p:spPr>
-          <a:xfrm>
-            <a:off x="8958201" y="4822845"/>
-            <a:ext cx="19594" cy="669492"/>
-          </a:xfrm>
-          <a:prstGeom prst="line">
-            <a:avLst/>
-          </a:prstGeom>
-          <a:ln>
-            <a:solidFill>
-              <a:schemeClr val="tx1"/>
-            </a:solidFill>
-            <a:headEnd type="triangle" w="lg" len="lg"/>
-            <a:tailEnd type="triangle" w="lg" len="lg"/>
-          </a:ln>
-        </p:spPr>
-        <p:style>
-          <a:lnRef idx="1">
-            <a:schemeClr val="accent1"/>
-          </a:lnRef>
-          <a:fillRef idx="0">
-            <a:schemeClr val="accent1"/>
-          </a:fillRef>
-          <a:effectRef idx="0">
-            <a:schemeClr val="accent1"/>
-          </a:effectRef>
-          <a:fontRef idx="minor">
-            <a:schemeClr val="tx1"/>
-          </a:fontRef>
-        </p:style>
-      </p:cxnSp>
-      <p:cxnSp>
-        <p:nvCxnSpPr>
-          <p:cNvPr id="41" name="Straight Connector 40">
-            <a:extLst>
-              <a:ext uri="{FF2B5EF4-FFF2-40B4-BE49-F238E27FC236}">
-                <a16:creationId xmlns:a16="http://schemas.microsoft.com/office/drawing/2014/main" id="{7C3C5C5D-70D8-9241-A8BB-CB1A1605E884}"/>
-              </a:ext>
-            </a:extLst>
-          </p:cNvPr>
-          <p:cNvCxnSpPr>
-            <a:cxnSpLocks/>
-            <a:stCxn id="9" idx="1"/>
-          </p:cNvCxnSpPr>
-          <p:nvPr/>
-        </p:nvCxnSpPr>
-        <p:spPr>
-          <a:xfrm flipH="1">
-            <a:off x="4546229" y="3275618"/>
-            <a:ext cx="1056722" cy="0"/>
-          </a:xfrm>
-          <a:prstGeom prst="line">
-            <a:avLst/>
-          </a:prstGeom>
-          <a:ln>
-            <a:solidFill>
-              <a:schemeClr val="tx1"/>
-            </a:solidFill>
-            <a:headEnd type="triangle" w="lg" len="lg"/>
-            <a:tailEnd type="triangle" w="lg" len="lg"/>
-          </a:ln>
-        </p:spPr>
-        <p:style>
-          <a:lnRef idx="1">
-            <a:schemeClr val="accent1"/>
-          </a:lnRef>
-          <a:fillRef idx="0">
-            <a:schemeClr val="accent1"/>
-          </a:fillRef>
-          <a:effectRef idx="0">
-            <a:schemeClr val="accent1"/>
-          </a:effectRef>
-          <a:fontRef idx="minor">
-            <a:schemeClr val="tx1"/>
-          </a:fontRef>
-        </p:style>
-      </p:cxnSp>
-      <p:cxnSp>
-        <p:nvCxnSpPr>
-          <p:cNvPr id="45" name="Straight Connector 44">
-            <a:extLst>
-              <a:ext uri="{FF2B5EF4-FFF2-40B4-BE49-F238E27FC236}">
-                <a16:creationId xmlns:a16="http://schemas.microsoft.com/office/drawing/2014/main" id="{F45D8498-D2FB-7D4A-976C-6065B350E83D}"/>
-              </a:ext>
-            </a:extLst>
-          </p:cNvPr>
-          <p:cNvCxnSpPr>
-            <a:cxnSpLocks/>
-          </p:cNvCxnSpPr>
-          <p:nvPr/>
-        </p:nvCxnSpPr>
-        <p:spPr>
-          <a:xfrm flipH="1">
-            <a:off x="2360611" y="4036549"/>
-            <a:ext cx="1225741" cy="0"/>
-          </a:xfrm>
-          <a:prstGeom prst="line">
-            <a:avLst/>
-          </a:prstGeom>
-          <a:ln>
-            <a:solidFill>
-              <a:schemeClr val="tx1"/>
-            </a:solidFill>
-            <a:headEnd type="triangle" w="lg" len="lg"/>
-            <a:tailEnd type="triangle" w="lg" len="lg"/>
-          </a:ln>
-        </p:spPr>
-        <p:style>
-          <a:lnRef idx="1">
-            <a:schemeClr val="accent1"/>
-          </a:lnRef>
-          <a:fillRef idx="0">
-            <a:schemeClr val="accent1"/>
-          </a:fillRef>
-          <a:effectRef idx="0">
-            <a:schemeClr val="accent1"/>
-          </a:effectRef>
-          <a:fontRef idx="minor">
-            <a:schemeClr val="tx1"/>
-          </a:fontRef>
-        </p:style>
-      </p:cxnSp>
-      <p:sp>
-        <p:nvSpPr>
-          <p:cNvPr id="51" name="TextBox 50">
-            <a:extLst>
-              <a:ext uri="{FF2B5EF4-FFF2-40B4-BE49-F238E27FC236}">
-                <a16:creationId xmlns:a16="http://schemas.microsoft.com/office/drawing/2014/main" id="{94F71D92-2FDF-B146-A32C-7EEC53290947}"/>
-              </a:ext>
-            </a:extLst>
-          </p:cNvPr>
-          <p:cNvSpPr txBox="1"/>
-          <p:nvPr/>
-        </p:nvSpPr>
-        <p:spPr>
-          <a:xfrm>
-            <a:off x="7405747" y="2792063"/>
-            <a:ext cx="643927" cy="369332"/>
-          </a:xfrm>
-          <a:prstGeom prst="rect">
-            <a:avLst/>
-          </a:prstGeom>
-          <a:noFill/>
-        </p:spPr>
-        <p:txBody>
-          <a:bodyPr wrap="square" rtlCol="0">
-            <a:spAutoFit/>
-          </a:bodyPr>
-          <a:lstStyle/>
-          <a:p>
-            <a:r>
-              <a:rPr lang="en-US" dirty="0"/>
-              <a:t>SOYs</a:t>
-            </a:r>
-            <a:endParaRPr lang="it-IT" dirty="0"/>
-          </a:p>
-        </p:txBody>
-      </p:sp>
-      <p:sp>
-        <p:nvSpPr>
-          <p:cNvPr id="52" name="TextBox 51">
-            <a:extLst>
-              <a:ext uri="{FF2B5EF4-FFF2-40B4-BE49-F238E27FC236}">
-                <a16:creationId xmlns:a16="http://schemas.microsoft.com/office/drawing/2014/main" id="{571CCF1B-B645-4445-BA70-655C19ECCDE1}"/>
-              </a:ext>
-            </a:extLst>
-          </p:cNvPr>
-          <p:cNvSpPr txBox="1"/>
-          <p:nvPr/>
-        </p:nvSpPr>
-        <p:spPr>
-          <a:xfrm>
-            <a:off x="2527758" y="2145595"/>
-            <a:ext cx="790962" cy="369332"/>
-          </a:xfrm>
-          <a:prstGeom prst="rect">
-            <a:avLst/>
-          </a:prstGeom>
-          <a:noFill/>
-        </p:spPr>
-        <p:txBody>
-          <a:bodyPr wrap="square" rtlCol="0">
-            <a:spAutoFit/>
-          </a:bodyPr>
-          <a:lstStyle/>
-          <a:p>
-            <a:r>
-              <a:rPr lang="en-US" dirty="0"/>
-              <a:t>JS/CSS</a:t>
-            </a:r>
-            <a:endParaRPr lang="it-IT" dirty="0"/>
-          </a:p>
-        </p:txBody>
-      </p:sp>
-      <p:sp>
-        <p:nvSpPr>
-          <p:cNvPr id="53" name="TextBox 52">
-            <a:extLst>
-              <a:ext uri="{FF2B5EF4-FFF2-40B4-BE49-F238E27FC236}">
-                <a16:creationId xmlns:a16="http://schemas.microsoft.com/office/drawing/2014/main" id="{59A4C3D8-9EFE-7A4E-9656-AF3FB6D77C59}"/>
-              </a:ext>
-            </a:extLst>
-          </p:cNvPr>
-          <p:cNvSpPr txBox="1"/>
-          <p:nvPr/>
-        </p:nvSpPr>
-        <p:spPr>
-          <a:xfrm>
-            <a:off x="2500204" y="3659900"/>
-            <a:ext cx="790962" cy="369332"/>
-          </a:xfrm>
-          <a:prstGeom prst="rect">
-            <a:avLst/>
-          </a:prstGeom>
-          <a:noFill/>
-        </p:spPr>
-        <p:txBody>
-          <a:bodyPr wrap="square" rtlCol="0">
-            <a:spAutoFit/>
-          </a:bodyPr>
-          <a:lstStyle/>
-          <a:p>
-            <a:r>
-              <a:rPr lang="en-US" dirty="0"/>
-              <a:t>HTML</a:t>
-            </a:r>
-            <a:endParaRPr lang="it-IT" dirty="0"/>
-          </a:p>
-        </p:txBody>
-      </p:sp>
-      <p:sp>
-        <p:nvSpPr>
-          <p:cNvPr id="54" name="TextBox 53">
-            <a:extLst>
-              <a:ext uri="{FF2B5EF4-FFF2-40B4-BE49-F238E27FC236}">
-                <a16:creationId xmlns:a16="http://schemas.microsoft.com/office/drawing/2014/main" id="{065E95BA-E358-084F-ADC5-2FDA91E489D2}"/>
-              </a:ext>
-            </a:extLst>
-          </p:cNvPr>
-          <p:cNvSpPr txBox="1"/>
-          <p:nvPr/>
-        </p:nvSpPr>
-        <p:spPr>
-          <a:xfrm>
-            <a:off x="4669450" y="2901628"/>
-            <a:ext cx="790962" cy="369332"/>
-          </a:xfrm>
-          <a:prstGeom prst="rect">
-            <a:avLst/>
-          </a:prstGeom>
-          <a:noFill/>
-        </p:spPr>
-        <p:txBody>
-          <a:bodyPr wrap="square" rtlCol="0">
-            <a:spAutoFit/>
-          </a:bodyPr>
-          <a:lstStyle/>
-          <a:p>
-            <a:r>
-              <a:rPr lang="en-US" dirty="0"/>
-              <a:t>HTML</a:t>
-            </a:r>
-            <a:endParaRPr lang="it-IT" dirty="0"/>
-          </a:p>
-        </p:txBody>
-      </p:sp>
-      <p:sp>
-        <p:nvSpPr>
-          <p:cNvPr id="61" name="TextBox 60">
-            <a:extLst>
-              <a:ext uri="{FF2B5EF4-FFF2-40B4-BE49-F238E27FC236}">
-                <a16:creationId xmlns:a16="http://schemas.microsoft.com/office/drawing/2014/main" id="{625FA95D-3EB8-D440-A681-3C7F338C5AA9}"/>
-              </a:ext>
-            </a:extLst>
-          </p:cNvPr>
-          <p:cNvSpPr txBox="1"/>
-          <p:nvPr/>
-        </p:nvSpPr>
-        <p:spPr>
-          <a:xfrm>
-            <a:off x="7351636" y="4058225"/>
-            <a:ext cx="790962" cy="369332"/>
-          </a:xfrm>
-          <a:prstGeom prst="rect">
-            <a:avLst/>
-          </a:prstGeom>
-          <a:noFill/>
-        </p:spPr>
-        <p:txBody>
-          <a:bodyPr wrap="square" rtlCol="0">
-            <a:spAutoFit/>
-          </a:bodyPr>
-          <a:lstStyle/>
-          <a:p>
-            <a:r>
-              <a:rPr lang="en-US" dirty="0"/>
-              <a:t>JSON</a:t>
-            </a:r>
-            <a:endParaRPr lang="it-IT" dirty="0"/>
-          </a:p>
-        </p:txBody>
-      </p:sp>
-      <p:sp>
-        <p:nvSpPr>
-          <p:cNvPr id="68" name="TextBox 67">
-            <a:extLst>
-              <a:ext uri="{FF2B5EF4-FFF2-40B4-BE49-F238E27FC236}">
-                <a16:creationId xmlns:a16="http://schemas.microsoft.com/office/drawing/2014/main" id="{4A0D1C7F-7E30-BF40-A341-BC575F2BB456}"/>
-              </a:ext>
-            </a:extLst>
-          </p:cNvPr>
-          <p:cNvSpPr txBox="1"/>
-          <p:nvPr/>
-        </p:nvSpPr>
-        <p:spPr>
-          <a:xfrm>
-            <a:off x="8175657" y="4968069"/>
-            <a:ext cx="967891" cy="369332"/>
-          </a:xfrm>
-          <a:prstGeom prst="rect">
-            <a:avLst/>
-          </a:prstGeom>
-          <a:noFill/>
-        </p:spPr>
-        <p:txBody>
-          <a:bodyPr wrap="square" rtlCol="0">
-            <a:spAutoFit/>
-          </a:bodyPr>
-          <a:lstStyle/>
-          <a:p>
-            <a:r>
-              <a:rPr lang="en-US" dirty="0"/>
-              <a:t>MOCKs</a:t>
-            </a:r>
-            <a:endParaRPr lang="it-IT" dirty="0"/>
-          </a:p>
-        </p:txBody>
-      </p:sp>
-      <p:sp>
-        <p:nvSpPr>
-          <p:cNvPr id="110" name="Rounded Rectangle 109">
-            <a:extLst>
-              <a:ext uri="{FF2B5EF4-FFF2-40B4-BE49-F238E27FC236}">
-                <a16:creationId xmlns:a16="http://schemas.microsoft.com/office/drawing/2014/main" id="{254AEA66-4E41-544C-BB02-8012E84DBA0F}"/>
-              </a:ext>
-            </a:extLst>
-          </p:cNvPr>
-          <p:cNvSpPr/>
-          <p:nvPr/>
-        </p:nvSpPr>
-        <p:spPr>
-          <a:xfrm>
-            <a:off x="10682457" y="4271779"/>
-            <a:ext cx="1041235" cy="669563"/>
-          </a:xfrm>
-          <a:prstGeom prst="roundRect">
-            <a:avLst/>
-          </a:prstGeom>
-          <a:solidFill>
-            <a:schemeClr val="bg2">
-              <a:lumMod val="90000"/>
-            </a:schemeClr>
-          </a:solidFill>
-          <a:ln w="25400">
-            <a:solidFill>
-              <a:schemeClr val="bg2">
-                <a:lumMod val="50000"/>
-              </a:schemeClr>
-            </a:solidFill>
-          </a:ln>
-        </p:spPr>
-        <p:style>
-          <a:lnRef idx="2">
-            <a:schemeClr val="accent1">
-              <a:shade val="50000"/>
-            </a:schemeClr>
-          </a:lnRef>
-          <a:fillRef idx="1">
-            <a:schemeClr val="accent1"/>
-          </a:fillRef>
-          <a:effectRef idx="0">
-            <a:schemeClr val="accent1"/>
-          </a:effectRef>
-          <a:fontRef idx="minor">
-            <a:schemeClr val="lt1"/>
-          </a:fontRef>
-        </p:style>
-        <p:txBody>
-          <a:bodyPr rtlCol="0" anchor="ctr"/>
-          <a:lstStyle/>
-          <a:p>
-            <a:pPr algn="ctr"/>
-            <a:r>
-              <a:rPr lang="en-US" dirty="0">
-                <a:solidFill>
-                  <a:schemeClr val="tx1"/>
-                </a:solidFill>
-              </a:rPr>
-              <a:t>LOC</a:t>
-            </a:r>
-            <a:endParaRPr lang="it-IT" dirty="0">
-              <a:solidFill>
-                <a:schemeClr val="tx1"/>
-              </a:solidFill>
-            </a:endParaRPr>
-          </a:p>
-        </p:txBody>
-      </p:sp>
-      <p:sp>
-        <p:nvSpPr>
-          <p:cNvPr id="111" name="Rounded Rectangle 110">
-            <a:extLst>
-              <a:ext uri="{FF2B5EF4-FFF2-40B4-BE49-F238E27FC236}">
-                <a16:creationId xmlns:a16="http://schemas.microsoft.com/office/drawing/2014/main" id="{E9F1CB7F-0274-6F4D-9C6E-5B0407F9FBFF}"/>
-              </a:ext>
-            </a:extLst>
-          </p:cNvPr>
-          <p:cNvSpPr/>
-          <p:nvPr/>
-        </p:nvSpPr>
-        <p:spPr>
-          <a:xfrm>
-            <a:off x="10682456" y="3265957"/>
-            <a:ext cx="1041235" cy="669563"/>
-          </a:xfrm>
-          <a:prstGeom prst="roundRect">
-            <a:avLst/>
-          </a:prstGeom>
-          <a:solidFill>
-            <a:schemeClr val="bg2">
-              <a:lumMod val="90000"/>
-            </a:schemeClr>
-          </a:solidFill>
-          <a:ln w="25400">
-            <a:solidFill>
-              <a:schemeClr val="bg2">
-                <a:lumMod val="50000"/>
-              </a:schemeClr>
-            </a:solidFill>
-          </a:ln>
-        </p:spPr>
-        <p:style>
-          <a:lnRef idx="2">
-            <a:schemeClr val="accent1">
-              <a:shade val="50000"/>
-            </a:schemeClr>
-          </a:lnRef>
-          <a:fillRef idx="1">
-            <a:schemeClr val="accent1"/>
-          </a:fillRef>
-          <a:effectRef idx="0">
-            <a:schemeClr val="accent1"/>
-          </a:effectRef>
-          <a:fontRef idx="minor">
-            <a:schemeClr val="lt1"/>
-          </a:fontRef>
-        </p:style>
-        <p:txBody>
-          <a:bodyPr rtlCol="0" anchor="ctr"/>
-          <a:lstStyle/>
-          <a:p>
-            <a:pPr algn="ctr"/>
-            <a:r>
-              <a:rPr lang="en-US" dirty="0">
-                <a:solidFill>
-                  <a:schemeClr val="tx1"/>
-                </a:solidFill>
-              </a:rPr>
-              <a:t>MVT</a:t>
-            </a:r>
-            <a:endParaRPr lang="it-IT" dirty="0">
-              <a:solidFill>
-                <a:schemeClr val="tx1"/>
-              </a:solidFill>
-            </a:endParaRPr>
-          </a:p>
-        </p:txBody>
-      </p:sp>
-      <p:sp>
-        <p:nvSpPr>
-          <p:cNvPr id="112" name="Rounded Rectangle 111">
-            <a:extLst>
-              <a:ext uri="{FF2B5EF4-FFF2-40B4-BE49-F238E27FC236}">
-                <a16:creationId xmlns:a16="http://schemas.microsoft.com/office/drawing/2014/main" id="{DFC91A64-62D9-AE47-A83D-5756628E96FF}"/>
-              </a:ext>
-            </a:extLst>
-          </p:cNvPr>
-          <p:cNvSpPr/>
-          <p:nvPr/>
-        </p:nvSpPr>
-        <p:spPr>
-          <a:xfrm>
-            <a:off x="10682455" y="5283395"/>
-            <a:ext cx="1041235" cy="669563"/>
-          </a:xfrm>
-          <a:prstGeom prst="roundRect">
-            <a:avLst/>
-          </a:prstGeom>
-          <a:solidFill>
-            <a:schemeClr val="bg2">
-              <a:lumMod val="90000"/>
-            </a:schemeClr>
-          </a:solidFill>
-          <a:ln w="25400">
-            <a:solidFill>
-              <a:schemeClr val="bg2">
-                <a:lumMod val="50000"/>
-              </a:schemeClr>
-            </a:solidFill>
-          </a:ln>
-        </p:spPr>
-        <p:style>
-          <a:lnRef idx="2">
-            <a:schemeClr val="accent1">
-              <a:shade val="50000"/>
-            </a:schemeClr>
-          </a:lnRef>
-          <a:fillRef idx="1">
-            <a:schemeClr val="accent1"/>
-          </a:fillRef>
-          <a:effectRef idx="0">
-            <a:schemeClr val="accent1"/>
-          </a:effectRef>
-          <a:fontRef idx="minor">
-            <a:schemeClr val="lt1"/>
-          </a:fontRef>
-        </p:style>
-        <p:txBody>
-          <a:bodyPr rtlCol="0" anchor="ctr"/>
-          <a:lstStyle/>
-          <a:p>
-            <a:pPr algn="ctr"/>
-            <a:r>
-              <a:rPr lang="en-US" dirty="0">
-                <a:solidFill>
-                  <a:schemeClr val="tx1"/>
-                </a:solidFill>
-              </a:rPr>
-              <a:t>…</a:t>
-            </a:r>
-            <a:endParaRPr lang="it-IT" dirty="0">
-              <a:solidFill>
-                <a:schemeClr val="tx1"/>
-              </a:solidFill>
-            </a:endParaRPr>
-          </a:p>
-        </p:txBody>
-      </p:sp>
-      <p:cxnSp>
-        <p:nvCxnSpPr>
-          <p:cNvPr id="113" name="Straight Connector 112">
-            <a:extLst>
-              <a:ext uri="{FF2B5EF4-FFF2-40B4-BE49-F238E27FC236}">
-                <a16:creationId xmlns:a16="http://schemas.microsoft.com/office/drawing/2014/main" id="{FBBE1CDF-A093-6C4F-828E-B68493D8E490}"/>
-              </a:ext>
-            </a:extLst>
-          </p:cNvPr>
-          <p:cNvCxnSpPr>
-            <a:cxnSpLocks/>
-            <a:stCxn id="11" idx="3"/>
-          </p:cNvCxnSpPr>
-          <p:nvPr/>
-        </p:nvCxnSpPr>
-        <p:spPr>
-          <a:xfrm flipV="1">
-            <a:off x="9590921" y="4427557"/>
-            <a:ext cx="882983" cy="0"/>
-          </a:xfrm>
-          <a:prstGeom prst="line">
-            <a:avLst/>
-          </a:prstGeom>
-          <a:ln>
-            <a:solidFill>
-              <a:schemeClr val="tx1"/>
-            </a:solidFill>
-            <a:headEnd type="triangle" w="lg" len="lg"/>
-            <a:tailEnd type="triangle" w="lg" len="lg"/>
-          </a:ln>
-        </p:spPr>
-        <p:style>
-          <a:lnRef idx="1">
-            <a:schemeClr val="accent1"/>
-          </a:lnRef>
-          <a:fillRef idx="0">
-            <a:schemeClr val="accent1"/>
-          </a:fillRef>
-          <a:effectRef idx="0">
-            <a:schemeClr val="accent1"/>
-          </a:effectRef>
-          <a:fontRef idx="minor">
-            <a:schemeClr val="tx1"/>
-          </a:fontRef>
-        </p:style>
-      </p:cxnSp>
-      <p:cxnSp>
-        <p:nvCxnSpPr>
-          <p:cNvPr id="143" name="Straight Connector 142">
-            <a:extLst>
-              <a:ext uri="{FF2B5EF4-FFF2-40B4-BE49-F238E27FC236}">
-                <a16:creationId xmlns:a16="http://schemas.microsoft.com/office/drawing/2014/main" id="{79530A06-AC42-7444-ADB8-895497A3FDCF}"/>
-              </a:ext>
-            </a:extLst>
-          </p:cNvPr>
-          <p:cNvCxnSpPr>
-            <a:cxnSpLocks/>
-          </p:cNvCxnSpPr>
-          <p:nvPr/>
-        </p:nvCxnSpPr>
-        <p:spPr>
-          <a:xfrm flipV="1">
-            <a:off x="6947017" y="2847209"/>
-            <a:ext cx="3686794" cy="0"/>
-          </a:xfrm>
-          <a:prstGeom prst="line">
-            <a:avLst/>
-          </a:prstGeom>
-          <a:ln>
-            <a:solidFill>
-              <a:schemeClr val="tx1"/>
-            </a:solidFill>
-            <a:headEnd type="triangle" w="lg" len="lg"/>
-            <a:tailEnd type="none" w="lg" len="lg"/>
-          </a:ln>
-        </p:spPr>
-        <p:style>
-          <a:lnRef idx="1">
-            <a:schemeClr val="accent1"/>
-          </a:lnRef>
-          <a:fillRef idx="0">
-            <a:schemeClr val="accent1"/>
-          </a:fillRef>
-          <a:effectRef idx="0">
-            <a:schemeClr val="accent1"/>
-          </a:effectRef>
-          <a:fontRef idx="minor">
-            <a:schemeClr val="tx1"/>
-          </a:fontRef>
-        </p:style>
-      </p:cxnSp>
-      <p:sp>
-        <p:nvSpPr>
-          <p:cNvPr id="34" name="Rounded Rectangle 33">
-            <a:extLst>
-              <a:ext uri="{FF2B5EF4-FFF2-40B4-BE49-F238E27FC236}">
-                <a16:creationId xmlns:a16="http://schemas.microsoft.com/office/drawing/2014/main" id="{3B1E788B-279E-5045-8662-014C2CC5A440}"/>
-              </a:ext>
-            </a:extLst>
-          </p:cNvPr>
-          <p:cNvSpPr/>
-          <p:nvPr/>
-        </p:nvSpPr>
-        <p:spPr>
-          <a:xfrm>
-            <a:off x="10682455" y="1372807"/>
-            <a:ext cx="1041235" cy="669563"/>
-          </a:xfrm>
-          <a:prstGeom prst="roundRect">
-            <a:avLst/>
-          </a:prstGeom>
-          <a:solidFill>
-            <a:schemeClr val="bg2">
-              <a:lumMod val="90000"/>
-            </a:schemeClr>
-          </a:solidFill>
-          <a:ln w="25400">
-            <a:solidFill>
-              <a:schemeClr val="bg2">
-                <a:lumMod val="50000"/>
-              </a:schemeClr>
-            </a:solidFill>
-          </a:ln>
-        </p:spPr>
-        <p:style>
-          <a:lnRef idx="2">
-            <a:schemeClr val="accent1">
-              <a:shade val="50000"/>
-            </a:schemeClr>
-          </a:lnRef>
-          <a:fillRef idx="1">
-            <a:schemeClr val="accent1"/>
-          </a:fillRef>
-          <a:effectRef idx="0">
-            <a:schemeClr val="accent1"/>
-          </a:effectRef>
-          <a:fontRef idx="minor">
-            <a:schemeClr val="lt1"/>
-          </a:fontRef>
-        </p:style>
-        <p:txBody>
-          <a:bodyPr rtlCol="0" anchor="ctr"/>
-          <a:lstStyle/>
-          <a:p>
-            <a:pPr algn="ctr"/>
-            <a:r>
-              <a:rPr lang="en-US" dirty="0">
-                <a:solidFill>
-                  <a:schemeClr val="tx1"/>
-                </a:solidFill>
-              </a:rPr>
-              <a:t>CONFIG</a:t>
-            </a:r>
-            <a:endParaRPr lang="it-IT" dirty="0">
-              <a:solidFill>
-                <a:schemeClr val="tx1"/>
-              </a:solidFill>
-            </a:endParaRPr>
-          </a:p>
-        </p:txBody>
-      </p:sp>
-      <p:cxnSp>
-        <p:nvCxnSpPr>
-          <p:cNvPr id="48" name="Straight Connector 47">
-            <a:extLst>
-              <a:ext uri="{FF2B5EF4-FFF2-40B4-BE49-F238E27FC236}">
-                <a16:creationId xmlns:a16="http://schemas.microsoft.com/office/drawing/2014/main" id="{08496846-9278-0143-AF16-C7DEF0053A89}"/>
-              </a:ext>
-            </a:extLst>
-          </p:cNvPr>
-          <p:cNvCxnSpPr>
-            <a:cxnSpLocks/>
-          </p:cNvCxnSpPr>
-          <p:nvPr/>
-        </p:nvCxnSpPr>
-        <p:spPr>
-          <a:xfrm flipH="1">
-            <a:off x="2360613" y="2477877"/>
-            <a:ext cx="8273198" cy="0"/>
-          </a:xfrm>
-          <a:prstGeom prst="line">
-            <a:avLst/>
-          </a:prstGeom>
-          <a:ln>
-            <a:solidFill>
-              <a:schemeClr val="tx1"/>
-            </a:solidFill>
-            <a:prstDash val="dash"/>
-            <a:headEnd type="none" w="lg" len="lg"/>
-            <a:tailEnd type="triangle" w="lg" len="lg"/>
-          </a:ln>
-        </p:spPr>
-        <p:style>
-          <a:lnRef idx="1">
-            <a:schemeClr val="accent1"/>
-          </a:lnRef>
-          <a:fillRef idx="0">
-            <a:schemeClr val="accent1"/>
-          </a:fillRef>
-          <a:effectRef idx="0">
-            <a:schemeClr val="accent1"/>
-          </a:effectRef>
-          <a:fontRef idx="minor">
-            <a:schemeClr val="tx1"/>
-          </a:fontRef>
-        </p:style>
-      </p:cxnSp>
-    </p:spTree>
-    <p:extLst>
-      <p:ext uri="{BB962C8B-B14F-4D97-AF65-F5344CB8AC3E}">
-        <p14:creationId xmlns:p14="http://schemas.microsoft.com/office/powerpoint/2010/main" val="3524492201"/>
-      </p:ext>
-    </p:extLst>
-  </p:cSld>
-  <p:clrMapOvr>
-    <a:masterClrMapping/>
-  </p:clrMapOvr>
-</p:sld>
-</file>
-
 <file path=ppt/theme/theme1.xml><?xml version="1.0" encoding="utf-8"?>
 <a:theme xmlns:a="http://schemas.openxmlformats.org/drawingml/2006/main" name="Office Theme">
   <a:themeElements>

</xml_diff>

<commit_message>
HPAY-4084: added no-stub option, updated readme
</commit_message>
<xml_diff>
--- a/local_environment/assets/local_env_arch.pptx
+++ b/local_environment/assets/local_env_arch.pptx
@@ -5,7 +5,8 @@
     <p:sldMasterId id="2147483648" r:id="rId1"/>
   </p:sldMasterIdLst>
   <p:sldIdLst>
-    <p:sldId id="256" r:id="rId2"/>
+    <p:sldId id="257" r:id="rId2"/>
+    <p:sldId id="256" r:id="rId3"/>
   </p:sldIdLst>
   <p:sldSz cx="12192000" cy="6858000"/>
   <p:notesSz cx="6858000" cy="9144000"/>
@@ -104,6 +105,11 @@
       </a:defRPr>
     </a:lvl9pPr>
   </p:defaultTextStyle>
+  <p:extLst>
+    <p:ext uri="{EFAFB233-063F-42B5-8137-9DF3F51BA10A}">
+      <p15:sldGuideLst xmlns:p15="http://schemas.microsoft.com/office/powerpoint/2012/main"/>
+    </p:ext>
+  </p:extLst>
 </p:presentation>
 </file>
 
@@ -256,7 +262,7 @@
           <a:p>
             <a:fld id="{42CAD5B1-4BB2-4442-9490-74870B774C0B}" type="datetimeFigureOut">
               <a:rPr lang="it-IT" smtClean="0"/>
-              <a:t>13/02/18</a:t>
+              <a:t>03/04/18</a:t>
             </a:fld>
             <a:endParaRPr lang="it-IT"/>
           </a:p>
@@ -456,7 +462,7 @@
           <a:p>
             <a:fld id="{42CAD5B1-4BB2-4442-9490-74870B774C0B}" type="datetimeFigureOut">
               <a:rPr lang="it-IT" smtClean="0"/>
-              <a:t>13/02/18</a:t>
+              <a:t>03/04/18</a:t>
             </a:fld>
             <a:endParaRPr lang="it-IT"/>
           </a:p>
@@ -666,7 +672,7 @@
           <a:p>
             <a:fld id="{42CAD5B1-4BB2-4442-9490-74870B774C0B}" type="datetimeFigureOut">
               <a:rPr lang="it-IT" smtClean="0"/>
-              <a:t>13/02/18</a:t>
+              <a:t>03/04/18</a:t>
             </a:fld>
             <a:endParaRPr lang="it-IT"/>
           </a:p>
@@ -866,7 +872,7 @@
           <a:p>
             <a:fld id="{42CAD5B1-4BB2-4442-9490-74870B774C0B}" type="datetimeFigureOut">
               <a:rPr lang="it-IT" smtClean="0"/>
-              <a:t>13/02/18</a:t>
+              <a:t>03/04/18</a:t>
             </a:fld>
             <a:endParaRPr lang="it-IT"/>
           </a:p>
@@ -1142,7 +1148,7 @@
           <a:p>
             <a:fld id="{42CAD5B1-4BB2-4442-9490-74870B774C0B}" type="datetimeFigureOut">
               <a:rPr lang="it-IT" smtClean="0"/>
-              <a:t>13/02/18</a:t>
+              <a:t>03/04/18</a:t>
             </a:fld>
             <a:endParaRPr lang="it-IT"/>
           </a:p>
@@ -1410,7 +1416,7 @@
           <a:p>
             <a:fld id="{42CAD5B1-4BB2-4442-9490-74870B774C0B}" type="datetimeFigureOut">
               <a:rPr lang="it-IT" smtClean="0"/>
-              <a:t>13/02/18</a:t>
+              <a:t>03/04/18</a:t>
             </a:fld>
             <a:endParaRPr lang="it-IT"/>
           </a:p>
@@ -1825,7 +1831,7 @@
           <a:p>
             <a:fld id="{42CAD5B1-4BB2-4442-9490-74870B774C0B}" type="datetimeFigureOut">
               <a:rPr lang="it-IT" smtClean="0"/>
-              <a:t>13/02/18</a:t>
+              <a:t>03/04/18</a:t>
             </a:fld>
             <a:endParaRPr lang="it-IT"/>
           </a:p>
@@ -1967,7 +1973,7 @@
           <a:p>
             <a:fld id="{42CAD5B1-4BB2-4442-9490-74870B774C0B}" type="datetimeFigureOut">
               <a:rPr lang="it-IT" smtClean="0"/>
-              <a:t>13/02/18</a:t>
+              <a:t>03/04/18</a:t>
             </a:fld>
             <a:endParaRPr lang="it-IT"/>
           </a:p>
@@ -2080,7 +2086,7 @@
           <a:p>
             <a:fld id="{42CAD5B1-4BB2-4442-9490-74870B774C0B}" type="datetimeFigureOut">
               <a:rPr lang="it-IT" smtClean="0"/>
-              <a:t>13/02/18</a:t>
+              <a:t>03/04/18</a:t>
             </a:fld>
             <a:endParaRPr lang="it-IT"/>
           </a:p>
@@ -2393,7 +2399,7 @@
           <a:p>
             <a:fld id="{42CAD5B1-4BB2-4442-9490-74870B774C0B}" type="datetimeFigureOut">
               <a:rPr lang="it-IT" smtClean="0"/>
-              <a:t>13/02/18</a:t>
+              <a:t>03/04/18</a:t>
             </a:fld>
             <a:endParaRPr lang="it-IT"/>
           </a:p>
@@ -2682,7 +2688,7 @@
           <a:p>
             <a:fld id="{42CAD5B1-4BB2-4442-9490-74870B774C0B}" type="datetimeFigureOut">
               <a:rPr lang="it-IT" smtClean="0"/>
-              <a:t>13/02/18</a:t>
+              <a:t>03/04/18</a:t>
             </a:fld>
             <a:endParaRPr lang="it-IT"/>
           </a:p>
@@ -2925,7 +2931,7 @@
           <a:p>
             <a:fld id="{42CAD5B1-4BB2-4442-9490-74870B774C0B}" type="datetimeFigureOut">
               <a:rPr lang="it-IT" smtClean="0"/>
-              <a:t>13/02/18</a:t>
+              <a:t>03/04/18</a:t>
             </a:fld>
             <a:endParaRPr lang="it-IT"/>
           </a:p>
@@ -3363,7 +3369,7 @@
         </p:blipFill>
         <p:spPr>
           <a:xfrm>
-            <a:off x="240757" y="2426503"/>
+            <a:off x="245548" y="1867231"/>
             <a:ext cx="2119854" cy="2169318"/>
           </a:xfrm>
           <a:prstGeom prst="rect">
@@ -3390,8 +3396,8 @@
         </p:nvSpPr>
         <p:spPr>
           <a:xfrm>
-            <a:off x="3341492" y="1554973"/>
-            <a:ext cx="6159695" cy="4702953"/>
+            <a:off x="3341492" y="1965623"/>
+            <a:ext cx="6159695" cy="4292303"/>
           </a:xfrm>
           <a:prstGeom prst="roundRect">
             <a:avLst>
@@ -3817,8 +3823,8 @@
         </p:nvSpPr>
         <p:spPr>
           <a:xfrm>
-            <a:off x="10446030" y="1554974"/>
-            <a:ext cx="1458343" cy="4702952"/>
+            <a:off x="10446030" y="467833"/>
+            <a:ext cx="1458343" cy="5790093"/>
           </a:xfrm>
           <a:prstGeom prst="roundRect">
             <a:avLst/>
@@ -4094,14 +4100,13 @@
           </p:cNvPr>
           <p:cNvCxnSpPr>
             <a:cxnSpLocks/>
-            <a:stCxn id="87" idx="1"/>
           </p:cNvCxnSpPr>
           <p:nvPr/>
         </p:nvCxnSpPr>
         <p:spPr>
-          <a:xfrm flipH="1" flipV="1">
-            <a:off x="2360611" y="2827821"/>
-            <a:ext cx="5646357" cy="38819"/>
+          <a:xfrm flipH="1">
+            <a:off x="2380399" y="1815173"/>
+            <a:ext cx="713676" cy="460194"/>
           </a:xfrm>
           <a:prstGeom prst="line">
             <a:avLst/>
@@ -4145,7 +4150,7 @@
         </p:nvCxnSpPr>
         <p:spPr>
           <a:xfrm flipH="1">
-            <a:off x="2360611" y="4036549"/>
+            <a:off x="2347067" y="3272554"/>
             <a:ext cx="1225741" cy="0"/>
           </a:xfrm>
           <a:prstGeom prst="line">
@@ -4224,7 +4229,7 @@
         </p:nvSpPr>
         <p:spPr>
           <a:xfrm>
-            <a:off x="2460543" y="2458489"/>
+            <a:off x="2753903" y="1465156"/>
             <a:ext cx="790962" cy="369332"/>
           </a:xfrm>
           <a:prstGeom prst="rect">
@@ -4260,7 +4265,7 @@
         </p:nvSpPr>
         <p:spPr>
           <a:xfrm>
-            <a:off x="2500204" y="3659900"/>
+            <a:off x="2553689" y="3263457"/>
             <a:ext cx="790962" cy="369332"/>
           </a:xfrm>
           <a:prstGeom prst="rect">
@@ -4392,10 +4397,10 @@
       </p:sp>
       <p:sp>
         <p:nvSpPr>
-          <p:cNvPr id="87" name="Rounded Rectangle 86">
-            <a:extLst>
-              <a:ext uri="{FF2B5EF4-FFF2-40B4-BE49-F238E27FC236}">
-                <a16:creationId xmlns:a16="http://schemas.microsoft.com/office/drawing/2014/main" id="{E06F4D88-7D71-434A-A6C5-CFE3925EC9D4}"/>
+          <p:cNvPr id="110" name="Rounded Rectangle 109">
+            <a:extLst>
+              <a:ext uri="{FF2B5EF4-FFF2-40B4-BE49-F238E27FC236}">
+                <a16:creationId xmlns:a16="http://schemas.microsoft.com/office/drawing/2014/main" id="{254AEA66-4E41-544C-BB02-8012E84DBA0F}"/>
               </a:ext>
             </a:extLst>
           </p:cNvPr>
@@ -4404,8 +4409,8 @@
         </p:nvSpPr>
         <p:spPr>
           <a:xfrm>
-            <a:off x="8006968" y="2516599"/>
-            <a:ext cx="1360106" cy="700082"/>
+            <a:off x="10654583" y="4453945"/>
+            <a:ext cx="1041235" cy="669563"/>
           </a:xfrm>
           <a:prstGeom prst="roundRect">
             <a:avLst/>
@@ -4450,18 +4455,7 @@
                   <a:schemeClr val="tx1"/>
                 </a:solidFill>
               </a:rPr>
-              <a:t>DA</a:t>
-            </a:r>
-          </a:p>
-          <a:p>
-            <a:pPr algn="ctr"/>
-            <a:r>
-              <a:rPr lang="en-US" dirty="0">
-                <a:solidFill>
-                  <a:schemeClr val="tx1"/>
-                </a:solidFill>
-              </a:rPr>
-              <a:t>DISP-1400</a:t>
+              <a:t>LOC</a:t>
             </a:r>
             <a:endParaRPr lang="it-IT" dirty="0">
               <a:solidFill>
@@ -4473,10 +4467,10 @@
       </p:sp>
       <p:sp>
         <p:nvSpPr>
-          <p:cNvPr id="110" name="Rounded Rectangle 109">
-            <a:extLst>
-              <a:ext uri="{FF2B5EF4-FFF2-40B4-BE49-F238E27FC236}">
-                <a16:creationId xmlns:a16="http://schemas.microsoft.com/office/drawing/2014/main" id="{254AEA66-4E41-544C-BB02-8012E84DBA0F}"/>
+          <p:cNvPr id="111" name="Rounded Rectangle 110">
+            <a:extLst>
+              <a:ext uri="{FF2B5EF4-FFF2-40B4-BE49-F238E27FC236}">
+                <a16:creationId xmlns:a16="http://schemas.microsoft.com/office/drawing/2014/main" id="{E9F1CB7F-0274-6F4D-9C6E-5B0407F9FBFF}"/>
               </a:ext>
             </a:extLst>
           </p:cNvPr>
@@ -4485,7 +4479,7 @@
         </p:nvSpPr>
         <p:spPr>
           <a:xfrm>
-            <a:off x="10654583" y="4453945"/>
+            <a:off x="10654582" y="3448123"/>
             <a:ext cx="1041235" cy="669563"/>
           </a:xfrm>
           <a:prstGeom prst="roundRect">
@@ -4531,7 +4525,7 @@
                   <a:schemeClr val="tx1"/>
                 </a:solidFill>
               </a:rPr>
-              <a:t>LOC</a:t>
+              <a:t>MVT</a:t>
             </a:r>
             <a:endParaRPr lang="it-IT" dirty="0">
               <a:solidFill>
@@ -4543,10 +4537,10 @@
       </p:sp>
       <p:sp>
         <p:nvSpPr>
-          <p:cNvPr id="111" name="Rounded Rectangle 110">
-            <a:extLst>
-              <a:ext uri="{FF2B5EF4-FFF2-40B4-BE49-F238E27FC236}">
-                <a16:creationId xmlns:a16="http://schemas.microsoft.com/office/drawing/2014/main" id="{E9F1CB7F-0274-6F4D-9C6E-5B0407F9FBFF}"/>
+          <p:cNvPr id="112" name="Rounded Rectangle 111">
+            <a:extLst>
+              <a:ext uri="{FF2B5EF4-FFF2-40B4-BE49-F238E27FC236}">
+                <a16:creationId xmlns:a16="http://schemas.microsoft.com/office/drawing/2014/main" id="{DFC91A64-62D9-AE47-A83D-5756628E96FF}"/>
               </a:ext>
             </a:extLst>
           </p:cNvPr>
@@ -4555,7 +4549,7 @@
         </p:nvSpPr>
         <p:spPr>
           <a:xfrm>
-            <a:off x="10654582" y="3448123"/>
+            <a:off x="10654581" y="5465561"/>
             <a:ext cx="1041235" cy="669563"/>
           </a:xfrm>
           <a:prstGeom prst="roundRect">
@@ -4601,7 +4595,7 @@
                   <a:schemeClr val="tx1"/>
                 </a:solidFill>
               </a:rPr>
-              <a:t>MVT</a:t>
+              <a:t>…</a:t>
             </a:r>
             <a:endParaRPr lang="it-IT" dirty="0">
               <a:solidFill>
@@ -4611,12 +4605,139 @@
           </a:p>
         </p:txBody>
       </p:sp>
-      <p:sp>
-        <p:nvSpPr>
-          <p:cNvPr id="112" name="Rounded Rectangle 111">
-            <a:extLst>
-              <a:ext uri="{FF2B5EF4-FFF2-40B4-BE49-F238E27FC236}">
-                <a16:creationId xmlns:a16="http://schemas.microsoft.com/office/drawing/2014/main" id="{DFC91A64-62D9-AE47-A83D-5756628E96FF}"/>
+      <p:cxnSp>
+        <p:nvCxnSpPr>
+          <p:cNvPr id="113" name="Straight Connector 112">
+            <a:extLst>
+              <a:ext uri="{FF2B5EF4-FFF2-40B4-BE49-F238E27FC236}">
+                <a16:creationId xmlns:a16="http://schemas.microsoft.com/office/drawing/2014/main" id="{FBBE1CDF-A093-6C4F-828E-B68493D8E490}"/>
+              </a:ext>
+            </a:extLst>
+          </p:cNvPr>
+          <p:cNvCxnSpPr>
+            <a:cxnSpLocks/>
+            <a:stCxn id="11" idx="3"/>
+          </p:cNvCxnSpPr>
+          <p:nvPr/>
+        </p:nvCxnSpPr>
+        <p:spPr>
+          <a:xfrm>
+            <a:off x="9319741" y="4185078"/>
+            <a:ext cx="1126289" cy="0"/>
+          </a:xfrm>
+          <a:prstGeom prst="line">
+            <a:avLst/>
+          </a:prstGeom>
+          <a:ln>
+            <a:solidFill>
+              <a:schemeClr val="tx1"/>
+            </a:solidFill>
+            <a:headEnd type="triangle" w="lg" len="lg"/>
+            <a:tailEnd type="triangle" w="lg" len="lg"/>
+          </a:ln>
+        </p:spPr>
+        <p:style>
+          <a:lnRef idx="1">
+            <a:schemeClr val="accent1"/>
+          </a:lnRef>
+          <a:fillRef idx="0">
+            <a:schemeClr val="accent1"/>
+          </a:fillRef>
+          <a:effectRef idx="0">
+            <a:schemeClr val="accent1"/>
+          </a:effectRef>
+          <a:fontRef idx="minor">
+            <a:schemeClr val="tx1"/>
+          </a:fontRef>
+        </p:style>
+      </p:cxnSp>
+      <p:cxnSp>
+        <p:nvCxnSpPr>
+          <p:cNvPr id="143" name="Straight Connector 142">
+            <a:extLst>
+              <a:ext uri="{FF2B5EF4-FFF2-40B4-BE49-F238E27FC236}">
+                <a16:creationId xmlns:a16="http://schemas.microsoft.com/office/drawing/2014/main" id="{79530A06-AC42-7444-ADB8-895497A3FDCF}"/>
+              </a:ext>
+            </a:extLst>
+          </p:cNvPr>
+          <p:cNvCxnSpPr>
+            <a:cxnSpLocks/>
+          </p:cNvCxnSpPr>
+          <p:nvPr/>
+        </p:nvCxnSpPr>
+        <p:spPr>
+          <a:xfrm flipV="1">
+            <a:off x="6921466" y="1775889"/>
+            <a:ext cx="3733114" cy="1715902"/>
+          </a:xfrm>
+          <a:prstGeom prst="line">
+            <a:avLst/>
+          </a:prstGeom>
+          <a:ln>
+            <a:solidFill>
+              <a:schemeClr val="tx1"/>
+            </a:solidFill>
+            <a:headEnd type="triangle" w="lg" len="lg"/>
+            <a:tailEnd type="none" w="lg" len="lg"/>
+          </a:ln>
+        </p:spPr>
+        <p:style>
+          <a:lnRef idx="1">
+            <a:schemeClr val="accent1"/>
+          </a:lnRef>
+          <a:fillRef idx="0">
+            <a:schemeClr val="accent1"/>
+          </a:fillRef>
+          <a:effectRef idx="0">
+            <a:schemeClr val="accent1"/>
+          </a:effectRef>
+          <a:fontRef idx="minor">
+            <a:schemeClr val="tx1"/>
+          </a:fontRef>
+        </p:style>
+      </p:cxnSp>
+      <p:sp>
+        <p:nvSpPr>
+          <p:cNvPr id="147" name="TextBox 146">
+            <a:extLst>
+              <a:ext uri="{FF2B5EF4-FFF2-40B4-BE49-F238E27FC236}">
+                <a16:creationId xmlns:a16="http://schemas.microsoft.com/office/drawing/2014/main" id="{05BD04F0-7362-3149-88C3-E7251C3859F8}"/>
+              </a:ext>
+            </a:extLst>
+          </p:cNvPr>
+          <p:cNvSpPr txBox="1"/>
+          <p:nvPr/>
+        </p:nvSpPr>
+        <p:spPr>
+          <a:xfrm>
+            <a:off x="9544448" y="1426316"/>
+            <a:ext cx="790962" cy="369332"/>
+          </a:xfrm>
+          <a:prstGeom prst="rect">
+            <a:avLst/>
+          </a:prstGeom>
+          <a:noFill/>
+        </p:spPr>
+        <p:txBody>
+          <a:bodyPr wrap="square" rtlCol="0">
+            <a:spAutoFit/>
+          </a:bodyPr>
+          <a:lstStyle/>
+          <a:p>
+            <a:r>
+              <a:rPr lang="en-US" dirty="0"/>
+              <a:t>JS/CSS</a:t>
+            </a:r>
+            <a:endParaRPr lang="it-IT" dirty="0"/>
+          </a:p>
+        </p:txBody>
+      </p:sp>
+      <p:sp>
+        <p:nvSpPr>
+          <p:cNvPr id="29" name="Rounded Rectangle 28">
+            <a:extLst>
+              <a:ext uri="{FF2B5EF4-FFF2-40B4-BE49-F238E27FC236}">
+                <a16:creationId xmlns:a16="http://schemas.microsoft.com/office/drawing/2014/main" id="{190CFE13-343F-0442-B5AF-E132AFE70E89}"/>
               </a:ext>
             </a:extLst>
           </p:cNvPr>
@@ -4625,8 +4746,8 @@
         </p:nvSpPr>
         <p:spPr>
           <a:xfrm>
-            <a:off x="10654581" y="5465561"/>
-            <a:ext cx="1041235" cy="669563"/>
+            <a:off x="10654580" y="1411273"/>
+            <a:ext cx="1041235" cy="700082"/>
           </a:xfrm>
           <a:prstGeom prst="roundRect">
             <a:avLst/>
@@ -4671,7 +4792,325 @@
                   <a:schemeClr val="tx1"/>
                 </a:solidFill>
               </a:rPr>
-              <a:t>…</a:t>
+              <a:t>DA</a:t>
+            </a:r>
+          </a:p>
+        </p:txBody>
+      </p:sp>
+      <p:cxnSp>
+        <p:nvCxnSpPr>
+          <p:cNvPr id="15" name="Straight Connector 14">
+            <a:extLst>
+              <a:ext uri="{FF2B5EF4-FFF2-40B4-BE49-F238E27FC236}">
+                <a16:creationId xmlns:a16="http://schemas.microsoft.com/office/drawing/2014/main" id="{26B12139-D0AF-0648-956B-68A4049DA693}"/>
+              </a:ext>
+            </a:extLst>
+          </p:cNvPr>
+          <p:cNvCxnSpPr>
+            <a:cxnSpLocks/>
+            <a:stCxn id="29" idx="1"/>
+          </p:cNvCxnSpPr>
+          <p:nvPr/>
+        </p:nvCxnSpPr>
+        <p:spPr>
+          <a:xfrm flipH="1">
+            <a:off x="3094074" y="1761314"/>
+            <a:ext cx="7560506" cy="53859"/>
+          </a:xfrm>
+          <a:prstGeom prst="line">
+            <a:avLst/>
+          </a:prstGeom>
+          <a:ln>
+            <a:solidFill>
+              <a:schemeClr val="tx1"/>
+            </a:solidFill>
+          </a:ln>
+        </p:spPr>
+        <p:style>
+          <a:lnRef idx="1">
+            <a:schemeClr val="accent1"/>
+          </a:lnRef>
+          <a:fillRef idx="0">
+            <a:schemeClr val="accent1"/>
+          </a:fillRef>
+          <a:effectRef idx="0">
+            <a:schemeClr val="accent1"/>
+          </a:effectRef>
+          <a:fontRef idx="minor">
+            <a:schemeClr val="tx1"/>
+          </a:fontRef>
+        </p:style>
+      </p:cxnSp>
+    </p:spTree>
+    <p:extLst>
+      <p:ext uri="{BB962C8B-B14F-4D97-AF65-F5344CB8AC3E}">
+        <p14:creationId xmlns:p14="http://schemas.microsoft.com/office/powerpoint/2010/main" val="514135546"/>
+      </p:ext>
+    </p:extLst>
+  </p:cSld>
+  <p:clrMapOvr>
+    <a:masterClrMapping/>
+  </p:clrMapOvr>
+</p:sld>
+</file>
+
+<file path=ppt/slides/slide2.xml><?xml version="1.0" encoding="utf-8"?>
+<p:sld xmlns:a="http://schemas.openxmlformats.org/drawingml/2006/main" xmlns:r="http://schemas.openxmlformats.org/officeDocument/2006/relationships" xmlns:p="http://schemas.openxmlformats.org/presentationml/2006/main">
+  <p:cSld>
+    <p:spTree>
+      <p:nvGrpSpPr>
+        <p:cNvPr id="1" name=""/>
+        <p:cNvGrpSpPr/>
+        <p:nvPr/>
+      </p:nvGrpSpPr>
+      <p:grpSpPr>
+        <a:xfrm>
+          <a:off x="0" y="0"/>
+          <a:ext cx="0" cy="0"/>
+          <a:chOff x="0" y="0"/>
+          <a:chExt cx="0" cy="0"/>
+        </a:xfrm>
+      </p:grpSpPr>
+      <p:sp>
+        <p:nvSpPr>
+          <p:cNvPr id="32" name="Rounded Rectangle 31">
+            <a:extLst>
+              <a:ext uri="{FF2B5EF4-FFF2-40B4-BE49-F238E27FC236}">
+                <a16:creationId xmlns:a16="http://schemas.microsoft.com/office/drawing/2014/main" id="{69A7D1E4-E568-3044-8025-ACBF59C79DC2}"/>
+              </a:ext>
+            </a:extLst>
+          </p:cNvPr>
+          <p:cNvSpPr/>
+          <p:nvPr/>
+        </p:nvSpPr>
+        <p:spPr>
+          <a:xfrm>
+            <a:off x="6537519" y="1554973"/>
+            <a:ext cx="2782221" cy="4762500"/>
+          </a:xfrm>
+          <a:prstGeom prst="roundRect">
+            <a:avLst>
+              <a:gd name="adj" fmla="val 5369"/>
+            </a:avLst>
+          </a:prstGeom>
+          <a:solidFill>
+            <a:schemeClr val="bg1">
+              <a:lumMod val="95000"/>
+            </a:schemeClr>
+          </a:solidFill>
+          <a:ln w="25400">
+            <a:solidFill>
+              <a:schemeClr val="bg1">
+                <a:lumMod val="75000"/>
+              </a:schemeClr>
+            </a:solidFill>
+          </a:ln>
+        </p:spPr>
+        <p:style>
+          <a:lnRef idx="2">
+            <a:schemeClr val="accent1">
+              <a:shade val="50000"/>
+            </a:schemeClr>
+          </a:lnRef>
+          <a:fillRef idx="1">
+            <a:schemeClr val="accent1"/>
+          </a:fillRef>
+          <a:effectRef idx="0">
+            <a:schemeClr val="accent1"/>
+          </a:effectRef>
+          <a:fontRef idx="minor">
+            <a:schemeClr val="lt1"/>
+          </a:fontRef>
+        </p:style>
+        <p:txBody>
+          <a:bodyPr rtlCol="0" anchor="t"/>
+          <a:lstStyle/>
+          <a:p>
+            <a:pPr algn="ctr"/>
+            <a:r>
+              <a:rPr lang="en-US" b="1" dirty="0">
+                <a:solidFill>
+                  <a:schemeClr val="tx1"/>
+                </a:solidFill>
+              </a:rPr>
+              <a:t>LOCAL</a:t>
+            </a:r>
+            <a:endParaRPr lang="it-IT" b="1" dirty="0">
+              <a:solidFill>
+                <a:schemeClr val="tx1"/>
+              </a:solidFill>
+            </a:endParaRPr>
+          </a:p>
+        </p:txBody>
+      </p:sp>
+      <p:pic>
+        <p:nvPicPr>
+          <p:cNvPr id="5" name="Picture 4">
+            <a:extLst>
+              <a:ext uri="{FF2B5EF4-FFF2-40B4-BE49-F238E27FC236}">
+                <a16:creationId xmlns:a16="http://schemas.microsoft.com/office/drawing/2014/main" id="{3F5B94D2-F2F0-744D-A37B-066F633FC3BD}"/>
+              </a:ext>
+            </a:extLst>
+          </p:cNvPr>
+          <p:cNvPicPr>
+            <a:picLocks noChangeAspect="1"/>
+          </p:cNvPicPr>
+          <p:nvPr/>
+        </p:nvPicPr>
+        <p:blipFill rotWithShape="1">
+          <a:blip r:embed="rId2"/>
+          <a:srcRect r="32515"/>
+          <a:stretch/>
+        </p:blipFill>
+        <p:spPr>
+          <a:xfrm>
+            <a:off x="240757" y="2426503"/>
+            <a:ext cx="2119854" cy="2169318"/>
+          </a:xfrm>
+          <a:prstGeom prst="rect">
+            <a:avLst/>
+          </a:prstGeom>
+          <a:ln>
+            <a:solidFill>
+              <a:schemeClr val="tx1"/>
+            </a:solidFill>
+          </a:ln>
+        </p:spPr>
+      </p:pic>
+      <p:sp>
+        <p:nvSpPr>
+          <p:cNvPr id="7" name="Rounded Rectangle 6">
+            <a:extLst>
+              <a:ext uri="{FF2B5EF4-FFF2-40B4-BE49-F238E27FC236}">
+                <a16:creationId xmlns:a16="http://schemas.microsoft.com/office/drawing/2014/main" id="{2D1BEBAF-98F4-504F-B3F0-D70FADC62F18}"/>
+              </a:ext>
+            </a:extLst>
+          </p:cNvPr>
+          <p:cNvSpPr/>
+          <p:nvPr/>
+        </p:nvSpPr>
+        <p:spPr>
+          <a:xfrm>
+            <a:off x="3341493" y="1554973"/>
+            <a:ext cx="1931940" cy="4702953"/>
+          </a:xfrm>
+          <a:prstGeom prst="roundRect">
+            <a:avLst>
+              <a:gd name="adj" fmla="val 7732"/>
+            </a:avLst>
+          </a:prstGeom>
+          <a:solidFill>
+            <a:schemeClr val="accent5">
+              <a:lumMod val="20000"/>
+              <a:lumOff val="80000"/>
+              <a:alpha val="20000"/>
+            </a:schemeClr>
+          </a:solidFill>
+          <a:ln w="25400">
+            <a:solidFill>
+              <a:schemeClr val="accent5">
+                <a:lumMod val="60000"/>
+                <a:lumOff val="40000"/>
+              </a:schemeClr>
+            </a:solidFill>
+          </a:ln>
+        </p:spPr>
+        <p:style>
+          <a:lnRef idx="2">
+            <a:schemeClr val="accent1">
+              <a:shade val="50000"/>
+            </a:schemeClr>
+          </a:lnRef>
+          <a:fillRef idx="1">
+            <a:schemeClr val="accent1"/>
+          </a:fillRef>
+          <a:effectRef idx="0">
+            <a:schemeClr val="accent1"/>
+          </a:effectRef>
+          <a:fontRef idx="minor">
+            <a:schemeClr val="lt1"/>
+          </a:fontRef>
+        </p:style>
+        <p:txBody>
+          <a:bodyPr rtlCol="0" anchor="t"/>
+          <a:lstStyle/>
+          <a:p>
+            <a:pPr algn="ctr"/>
+            <a:r>
+              <a:rPr lang="en-US" b="1" dirty="0">
+                <a:solidFill>
+                  <a:schemeClr val="tx1"/>
+                </a:solidFill>
+              </a:rPr>
+              <a:t>DOCKER@LOCAL</a:t>
+            </a:r>
+            <a:endParaRPr lang="it-IT" b="1" dirty="0">
+              <a:solidFill>
+                <a:schemeClr val="tx1"/>
+              </a:solidFill>
+            </a:endParaRPr>
+          </a:p>
+        </p:txBody>
+      </p:sp>
+      <p:sp>
+        <p:nvSpPr>
+          <p:cNvPr id="10" name="Rounded Rectangle 9">
+            <a:extLst>
+              <a:ext uri="{FF2B5EF4-FFF2-40B4-BE49-F238E27FC236}">
+                <a16:creationId xmlns:a16="http://schemas.microsoft.com/office/drawing/2014/main" id="{D7AD22DD-3607-1A49-964E-90D9DA4553D7}"/>
+              </a:ext>
+            </a:extLst>
+          </p:cNvPr>
+          <p:cNvSpPr/>
+          <p:nvPr/>
+        </p:nvSpPr>
+        <p:spPr>
+          <a:xfrm>
+            <a:off x="7295908" y="5265822"/>
+            <a:ext cx="1265441" cy="785834"/>
+          </a:xfrm>
+          <a:prstGeom prst="roundRect">
+            <a:avLst/>
+          </a:prstGeom>
+          <a:solidFill>
+            <a:srgbClr val="FF0000">
+              <a:alpha val="20000"/>
+            </a:srgbClr>
+          </a:solidFill>
+          <a:ln w="25400">
+            <a:solidFill>
+              <a:srgbClr val="FF0000"/>
+            </a:solidFill>
+          </a:ln>
+        </p:spPr>
+        <p:style>
+          <a:lnRef idx="2">
+            <a:schemeClr val="accent1">
+              <a:shade val="50000"/>
+            </a:schemeClr>
+          </a:lnRef>
+          <a:fillRef idx="1">
+            <a:schemeClr val="accent1"/>
+          </a:fillRef>
+          <a:effectRef idx="0">
+            <a:schemeClr val="accent1"/>
+          </a:effectRef>
+          <a:fontRef idx="minor">
+            <a:schemeClr val="lt1"/>
+          </a:fontRef>
+        </p:style>
+        <p:txBody>
+          <a:bodyPr rtlCol="0" anchor="ctr"/>
+          <a:lstStyle/>
+          <a:p>
+            <a:pPr algn="ctr"/>
+            <a:r>
+              <a:rPr lang="en-US" dirty="0">
+                <a:solidFill>
+                  <a:schemeClr val="tx1"/>
+                </a:solidFill>
+              </a:rPr>
+              <a:t>CHECKITO</a:t>
             </a:r>
             <a:endParaRPr lang="it-IT" dirty="0">
               <a:solidFill>
@@ -4681,25 +5120,306 @@
           </a:p>
         </p:txBody>
       </p:sp>
+      <p:sp>
+        <p:nvSpPr>
+          <p:cNvPr id="11" name="Rounded Rectangle 10">
+            <a:extLst>
+              <a:ext uri="{FF2B5EF4-FFF2-40B4-BE49-F238E27FC236}">
+                <a16:creationId xmlns:a16="http://schemas.microsoft.com/office/drawing/2014/main" id="{B3432DC2-2BDF-694B-9115-66803DD30B41}"/>
+              </a:ext>
+            </a:extLst>
+          </p:cNvPr>
+          <p:cNvSpPr/>
+          <p:nvPr/>
+        </p:nvSpPr>
+        <p:spPr>
+          <a:xfrm>
+            <a:off x="6853412" y="2700670"/>
+            <a:ext cx="2150433" cy="1697276"/>
+          </a:xfrm>
+          <a:prstGeom prst="roundRect">
+            <a:avLst/>
+          </a:prstGeom>
+          <a:solidFill>
+            <a:srgbClr val="FF0000">
+              <a:alpha val="20000"/>
+            </a:srgbClr>
+          </a:solidFill>
+          <a:ln w="25400">
+            <a:solidFill>
+              <a:srgbClr val="FF0000"/>
+            </a:solidFill>
+          </a:ln>
+        </p:spPr>
+        <p:style>
+          <a:lnRef idx="2">
+            <a:schemeClr val="accent1">
+              <a:shade val="50000"/>
+            </a:schemeClr>
+          </a:lnRef>
+          <a:fillRef idx="1">
+            <a:schemeClr val="accent1"/>
+          </a:fillRef>
+          <a:effectRef idx="0">
+            <a:schemeClr val="accent1"/>
+          </a:effectRef>
+          <a:fontRef idx="minor">
+            <a:schemeClr val="lt1"/>
+          </a:fontRef>
+        </p:style>
+        <p:txBody>
+          <a:bodyPr rtlCol="0" anchor="ctr"/>
+          <a:lstStyle/>
+          <a:p>
+            <a:pPr algn="ctr"/>
+            <a:r>
+              <a:rPr lang="en-US" dirty="0">
+                <a:solidFill>
+                  <a:schemeClr val="tx1"/>
+                </a:solidFill>
+              </a:rPr>
+              <a:t>BA</a:t>
+            </a:r>
+            <a:endParaRPr lang="it-IT" dirty="0">
+              <a:solidFill>
+                <a:schemeClr val="tx1"/>
+              </a:solidFill>
+            </a:endParaRPr>
+          </a:p>
+        </p:txBody>
+      </p:sp>
+      <p:sp>
+        <p:nvSpPr>
+          <p:cNvPr id="12" name="Rounded Rectangle 11">
+            <a:extLst>
+              <a:ext uri="{FF2B5EF4-FFF2-40B4-BE49-F238E27FC236}">
+                <a16:creationId xmlns:a16="http://schemas.microsoft.com/office/drawing/2014/main" id="{018BB6F3-4C3E-9947-AACC-BB833FE4D00D}"/>
+              </a:ext>
+            </a:extLst>
+          </p:cNvPr>
+          <p:cNvSpPr/>
+          <p:nvPr/>
+        </p:nvSpPr>
+        <p:spPr>
+          <a:xfrm>
+            <a:off x="3586352" y="2516599"/>
+            <a:ext cx="1424162" cy="3409233"/>
+          </a:xfrm>
+          <a:prstGeom prst="roundRect">
+            <a:avLst/>
+          </a:prstGeom>
+          <a:solidFill>
+            <a:schemeClr val="accent6">
+              <a:lumMod val="20000"/>
+              <a:lumOff val="80000"/>
+            </a:schemeClr>
+          </a:solidFill>
+          <a:ln w="25400">
+            <a:solidFill>
+              <a:schemeClr val="accent6">
+                <a:lumMod val="60000"/>
+                <a:lumOff val="40000"/>
+              </a:schemeClr>
+            </a:solidFill>
+          </a:ln>
+        </p:spPr>
+        <p:style>
+          <a:lnRef idx="2">
+            <a:schemeClr val="accent1">
+              <a:shade val="50000"/>
+            </a:schemeClr>
+          </a:lnRef>
+          <a:fillRef idx="1">
+            <a:schemeClr val="accent1"/>
+          </a:fillRef>
+          <a:effectRef idx="0">
+            <a:schemeClr val="accent1"/>
+          </a:effectRef>
+          <a:fontRef idx="minor">
+            <a:schemeClr val="lt1"/>
+          </a:fontRef>
+        </p:style>
+        <p:txBody>
+          <a:bodyPr rtlCol="0" anchor="ctr"/>
+          <a:lstStyle/>
+          <a:p>
+            <a:pPr algn="ctr"/>
+            <a:r>
+              <a:rPr lang="en-US" dirty="0">
+                <a:solidFill>
+                  <a:schemeClr val="tx1"/>
+                </a:solidFill>
+              </a:rPr>
+              <a:t>APACHE</a:t>
+            </a:r>
+            <a:endParaRPr lang="it-IT" dirty="0">
+              <a:solidFill>
+                <a:schemeClr val="tx1"/>
+              </a:solidFill>
+            </a:endParaRPr>
+          </a:p>
+        </p:txBody>
+      </p:sp>
+      <p:sp>
+        <p:nvSpPr>
+          <p:cNvPr id="13" name="Rounded Rectangle 12">
+            <a:extLst>
+              <a:ext uri="{FF2B5EF4-FFF2-40B4-BE49-F238E27FC236}">
+                <a16:creationId xmlns:a16="http://schemas.microsoft.com/office/drawing/2014/main" id="{16F77CBC-6F58-7A46-B225-7D4851146257}"/>
+              </a:ext>
+            </a:extLst>
+          </p:cNvPr>
+          <p:cNvSpPr/>
+          <p:nvPr/>
+        </p:nvSpPr>
+        <p:spPr>
+          <a:xfrm>
+            <a:off x="10446030" y="733647"/>
+            <a:ext cx="1458343" cy="5583826"/>
+          </a:xfrm>
+          <a:prstGeom prst="roundRect">
+            <a:avLst/>
+          </a:prstGeom>
+          <a:solidFill>
+            <a:schemeClr val="bg1">
+              <a:lumMod val="95000"/>
+            </a:schemeClr>
+          </a:solidFill>
+          <a:ln w="25400">
+            <a:solidFill>
+              <a:schemeClr val="bg1">
+                <a:lumMod val="75000"/>
+              </a:schemeClr>
+            </a:solidFill>
+          </a:ln>
+        </p:spPr>
+        <p:style>
+          <a:lnRef idx="2">
+            <a:schemeClr val="accent1">
+              <a:shade val="50000"/>
+            </a:schemeClr>
+          </a:lnRef>
+          <a:fillRef idx="1">
+            <a:schemeClr val="accent1"/>
+          </a:fillRef>
+          <a:effectRef idx="0">
+            <a:schemeClr val="accent1"/>
+          </a:effectRef>
+          <a:fontRef idx="minor">
+            <a:schemeClr val="lt1"/>
+          </a:fontRef>
+        </p:style>
+        <p:txBody>
+          <a:bodyPr rtlCol="0" anchor="t"/>
+          <a:lstStyle/>
+          <a:p>
+            <a:pPr algn="ctr"/>
+            <a:r>
+              <a:rPr lang="en-US" b="1" dirty="0">
+                <a:solidFill>
+                  <a:schemeClr val="tx1"/>
+                </a:solidFill>
+              </a:rPr>
+              <a:t>STAGING</a:t>
+            </a:r>
+            <a:endParaRPr lang="it-IT" b="1" dirty="0">
+              <a:solidFill>
+                <a:schemeClr val="tx1"/>
+              </a:solidFill>
+            </a:endParaRPr>
+          </a:p>
+        </p:txBody>
+      </p:sp>
+      <p:sp>
+        <p:nvSpPr>
+          <p:cNvPr id="19" name="Rounded Rectangle 18">
+            <a:extLst>
+              <a:ext uri="{FF2B5EF4-FFF2-40B4-BE49-F238E27FC236}">
+                <a16:creationId xmlns:a16="http://schemas.microsoft.com/office/drawing/2014/main" id="{78988F75-6A52-EA47-9818-46EA9CF27CF9}"/>
+              </a:ext>
+            </a:extLst>
+          </p:cNvPr>
+          <p:cNvSpPr/>
+          <p:nvPr/>
+        </p:nvSpPr>
+        <p:spPr>
+          <a:xfrm>
+            <a:off x="10654581" y="2441573"/>
+            <a:ext cx="1041235" cy="669563"/>
+          </a:xfrm>
+          <a:prstGeom prst="roundRect">
+            <a:avLst/>
+          </a:prstGeom>
+          <a:solidFill>
+            <a:schemeClr val="bg2">
+              <a:lumMod val="90000"/>
+            </a:schemeClr>
+          </a:solidFill>
+          <a:ln w="25400">
+            <a:solidFill>
+              <a:schemeClr val="bg2">
+                <a:lumMod val="50000"/>
+              </a:schemeClr>
+            </a:solidFill>
+          </a:ln>
+        </p:spPr>
+        <p:style>
+          <a:lnRef idx="2">
+            <a:schemeClr val="accent1">
+              <a:shade val="50000"/>
+            </a:schemeClr>
+          </a:lnRef>
+          <a:fillRef idx="1">
+            <a:schemeClr val="accent1"/>
+          </a:fillRef>
+          <a:effectRef idx="0">
+            <a:schemeClr val="accent1"/>
+          </a:effectRef>
+          <a:fontRef idx="minor">
+            <a:schemeClr val="lt1"/>
+          </a:fontRef>
+        </p:style>
+        <p:txBody>
+          <a:bodyPr rtlCol="0" anchor="ctr"/>
+          <a:lstStyle/>
+          <a:p>
+            <a:pPr algn="ctr"/>
+            <a:r>
+              <a:rPr lang="en-US" dirty="0">
+                <a:solidFill>
+                  <a:schemeClr val="tx1"/>
+                </a:solidFill>
+              </a:rPr>
+              <a:t>CONFIG</a:t>
+            </a:r>
+            <a:endParaRPr lang="it-IT" dirty="0">
+              <a:solidFill>
+                <a:schemeClr val="tx1"/>
+              </a:solidFill>
+            </a:endParaRPr>
+          </a:p>
+        </p:txBody>
+      </p:sp>
       <p:cxnSp>
         <p:nvCxnSpPr>
-          <p:cNvPr id="113" name="Straight Connector 112">
-            <a:extLst>
-              <a:ext uri="{FF2B5EF4-FFF2-40B4-BE49-F238E27FC236}">
-                <a16:creationId xmlns:a16="http://schemas.microsoft.com/office/drawing/2014/main" id="{FBBE1CDF-A093-6C4F-828E-B68493D8E490}"/>
+          <p:cNvPr id="28" name="Straight Connector 27">
+            <a:extLst>
+              <a:ext uri="{FF2B5EF4-FFF2-40B4-BE49-F238E27FC236}">
+                <a16:creationId xmlns:a16="http://schemas.microsoft.com/office/drawing/2014/main" id="{843BAC9C-DAB2-5F41-B468-90952ED511CE}"/>
               </a:ext>
             </a:extLst>
           </p:cNvPr>
           <p:cNvCxnSpPr>
             <a:cxnSpLocks/>
-            <a:stCxn id="11" idx="3"/>
+            <a:stCxn id="11" idx="2"/>
+            <a:endCxn id="10" idx="0"/>
           </p:cNvCxnSpPr>
           <p:nvPr/>
         </p:nvCxnSpPr>
         <p:spPr>
           <a:xfrm>
-            <a:off x="9319741" y="4185078"/>
-            <a:ext cx="1126289" cy="0"/>
+            <a:off x="7928629" y="4397946"/>
+            <a:ext cx="0" cy="867876"/>
           </a:xfrm>
           <a:prstGeom prst="line">
             <a:avLst/>
@@ -4729,10 +5449,103 @@
       </p:cxnSp>
       <p:cxnSp>
         <p:nvCxnSpPr>
-          <p:cNvPr id="143" name="Straight Connector 142">
-            <a:extLst>
-              <a:ext uri="{FF2B5EF4-FFF2-40B4-BE49-F238E27FC236}">
-                <a16:creationId xmlns:a16="http://schemas.microsoft.com/office/drawing/2014/main" id="{79530A06-AC42-7444-ADB8-895497A3FDCF}"/>
+          <p:cNvPr id="41" name="Straight Connector 40">
+            <a:extLst>
+              <a:ext uri="{FF2B5EF4-FFF2-40B4-BE49-F238E27FC236}">
+                <a16:creationId xmlns:a16="http://schemas.microsoft.com/office/drawing/2014/main" id="{7C3C5C5D-70D8-9241-A8BB-CB1A1605E884}"/>
+              </a:ext>
+            </a:extLst>
+          </p:cNvPr>
+          <p:cNvCxnSpPr>
+            <a:cxnSpLocks/>
+            <a:stCxn id="11" idx="1"/>
+          </p:cNvCxnSpPr>
+          <p:nvPr/>
+        </p:nvCxnSpPr>
+        <p:spPr>
+          <a:xfrm flipH="1">
+            <a:off x="5016970" y="3549308"/>
+            <a:ext cx="1836442" cy="8022"/>
+          </a:xfrm>
+          <a:prstGeom prst="line">
+            <a:avLst/>
+          </a:prstGeom>
+          <a:ln>
+            <a:solidFill>
+              <a:schemeClr val="tx1"/>
+            </a:solidFill>
+            <a:headEnd type="triangle" w="lg" len="lg"/>
+            <a:tailEnd type="triangle" w="lg" len="lg"/>
+          </a:ln>
+        </p:spPr>
+        <p:style>
+          <a:lnRef idx="1">
+            <a:schemeClr val="accent1"/>
+          </a:lnRef>
+          <a:fillRef idx="0">
+            <a:schemeClr val="accent1"/>
+          </a:fillRef>
+          <a:effectRef idx="0">
+            <a:schemeClr val="accent1"/>
+          </a:effectRef>
+          <a:fontRef idx="minor">
+            <a:schemeClr val="tx1"/>
+          </a:fontRef>
+        </p:style>
+      </p:cxnSp>
+      <p:cxnSp>
+        <p:nvCxnSpPr>
+          <p:cNvPr id="48" name="Straight Connector 47">
+            <a:extLst>
+              <a:ext uri="{FF2B5EF4-FFF2-40B4-BE49-F238E27FC236}">
+                <a16:creationId xmlns:a16="http://schemas.microsoft.com/office/drawing/2014/main" id="{08496846-9278-0143-AF16-C7DEF0053A89}"/>
+              </a:ext>
+            </a:extLst>
+          </p:cNvPr>
+          <p:cNvCxnSpPr>
+            <a:cxnSpLocks/>
+            <a:stCxn id="87" idx="1"/>
+          </p:cNvCxnSpPr>
+          <p:nvPr/>
+        </p:nvCxnSpPr>
+        <p:spPr>
+          <a:xfrm flipH="1">
+            <a:off x="2360611" y="1836323"/>
+            <a:ext cx="8293969" cy="1092359"/>
+          </a:xfrm>
+          <a:prstGeom prst="line">
+            <a:avLst/>
+          </a:prstGeom>
+          <a:ln>
+            <a:solidFill>
+              <a:schemeClr val="tx1"/>
+            </a:solidFill>
+            <a:prstDash val="dash"/>
+            <a:headEnd type="none" w="lg" len="lg"/>
+            <a:tailEnd type="triangle" w="lg" len="lg"/>
+          </a:ln>
+        </p:spPr>
+        <p:style>
+          <a:lnRef idx="1">
+            <a:schemeClr val="accent1"/>
+          </a:lnRef>
+          <a:fillRef idx="0">
+            <a:schemeClr val="accent1"/>
+          </a:fillRef>
+          <a:effectRef idx="0">
+            <a:schemeClr val="accent1"/>
+          </a:effectRef>
+          <a:fontRef idx="minor">
+            <a:schemeClr val="tx1"/>
+          </a:fontRef>
+        </p:style>
+      </p:cxnSp>
+      <p:cxnSp>
+        <p:nvCxnSpPr>
+          <p:cNvPr id="45" name="Straight Connector 44">
+            <a:extLst>
+              <a:ext uri="{FF2B5EF4-FFF2-40B4-BE49-F238E27FC236}">
+                <a16:creationId xmlns:a16="http://schemas.microsoft.com/office/drawing/2014/main" id="{F45D8498-D2FB-7D4A-976C-6065B350E83D}"/>
               </a:ext>
             </a:extLst>
           </p:cNvPr>
@@ -4742,9 +5555,555 @@
           <p:nvPr/>
         </p:nvCxnSpPr>
         <p:spPr>
+          <a:xfrm flipH="1">
+            <a:off x="2360611" y="4036549"/>
+            <a:ext cx="1225741" cy="0"/>
+          </a:xfrm>
+          <a:prstGeom prst="line">
+            <a:avLst/>
+          </a:prstGeom>
+          <a:ln>
+            <a:solidFill>
+              <a:schemeClr val="tx1"/>
+            </a:solidFill>
+            <a:headEnd type="triangle" w="lg" len="lg"/>
+            <a:tailEnd type="triangle" w="lg" len="lg"/>
+          </a:ln>
+        </p:spPr>
+        <p:style>
+          <a:lnRef idx="1">
+            <a:schemeClr val="accent1"/>
+          </a:lnRef>
+          <a:fillRef idx="0">
+            <a:schemeClr val="accent1"/>
+          </a:fillRef>
+          <a:effectRef idx="0">
+            <a:schemeClr val="accent1"/>
+          </a:effectRef>
+          <a:fontRef idx="minor">
+            <a:schemeClr val="tx1"/>
+          </a:fontRef>
+        </p:style>
+      </p:cxnSp>
+      <p:sp>
+        <p:nvSpPr>
+          <p:cNvPr id="51" name="TextBox 50">
+            <a:extLst>
+              <a:ext uri="{FF2B5EF4-FFF2-40B4-BE49-F238E27FC236}">
+                <a16:creationId xmlns:a16="http://schemas.microsoft.com/office/drawing/2014/main" id="{94F71D92-2FDF-B146-A32C-7EEC53290947}"/>
+              </a:ext>
+            </a:extLst>
+          </p:cNvPr>
+          <p:cNvSpPr txBox="1"/>
+          <p:nvPr/>
+        </p:nvSpPr>
+        <p:spPr>
+          <a:xfrm>
+            <a:off x="9497484" y="2241837"/>
+            <a:ext cx="643927" cy="369332"/>
+          </a:xfrm>
+          <a:prstGeom prst="rect">
+            <a:avLst/>
+          </a:prstGeom>
+          <a:noFill/>
+        </p:spPr>
+        <p:txBody>
+          <a:bodyPr wrap="square" rtlCol="0">
+            <a:spAutoFit/>
+          </a:bodyPr>
+          <a:lstStyle/>
+          <a:p>
+            <a:r>
+              <a:rPr lang="en-US" dirty="0"/>
+              <a:t>SOYs</a:t>
+            </a:r>
+            <a:endParaRPr lang="it-IT" dirty="0"/>
+          </a:p>
+        </p:txBody>
+      </p:sp>
+      <p:sp>
+        <p:nvSpPr>
+          <p:cNvPr id="52" name="TextBox 51">
+            <a:extLst>
+              <a:ext uri="{FF2B5EF4-FFF2-40B4-BE49-F238E27FC236}">
+                <a16:creationId xmlns:a16="http://schemas.microsoft.com/office/drawing/2014/main" id="{571CCF1B-B645-4445-BA70-655C19ECCDE1}"/>
+              </a:ext>
+            </a:extLst>
+          </p:cNvPr>
+          <p:cNvSpPr txBox="1"/>
+          <p:nvPr/>
+        </p:nvSpPr>
+        <p:spPr>
+          <a:xfrm>
+            <a:off x="2460543" y="2458489"/>
+            <a:ext cx="790962" cy="369332"/>
+          </a:xfrm>
+          <a:prstGeom prst="rect">
+            <a:avLst/>
+          </a:prstGeom>
+          <a:noFill/>
+        </p:spPr>
+        <p:txBody>
+          <a:bodyPr wrap="square" rtlCol="0">
+            <a:spAutoFit/>
+          </a:bodyPr>
+          <a:lstStyle/>
+          <a:p>
+            <a:r>
+              <a:rPr lang="en-US" dirty="0"/>
+              <a:t>JS/CSS</a:t>
+            </a:r>
+            <a:endParaRPr lang="it-IT" dirty="0"/>
+          </a:p>
+        </p:txBody>
+      </p:sp>
+      <p:sp>
+        <p:nvSpPr>
+          <p:cNvPr id="53" name="TextBox 52">
+            <a:extLst>
+              <a:ext uri="{FF2B5EF4-FFF2-40B4-BE49-F238E27FC236}">
+                <a16:creationId xmlns:a16="http://schemas.microsoft.com/office/drawing/2014/main" id="{59A4C3D8-9EFE-7A4E-9656-AF3FB6D77C59}"/>
+              </a:ext>
+            </a:extLst>
+          </p:cNvPr>
+          <p:cNvSpPr txBox="1"/>
+          <p:nvPr/>
+        </p:nvSpPr>
+        <p:spPr>
+          <a:xfrm>
+            <a:off x="2500204" y="3659900"/>
+            <a:ext cx="790962" cy="369332"/>
+          </a:xfrm>
+          <a:prstGeom prst="rect">
+            <a:avLst/>
+          </a:prstGeom>
+          <a:noFill/>
+        </p:spPr>
+        <p:txBody>
+          <a:bodyPr wrap="square" rtlCol="0">
+            <a:spAutoFit/>
+          </a:bodyPr>
+          <a:lstStyle/>
+          <a:p>
+            <a:r>
+              <a:rPr lang="en-US" dirty="0"/>
+              <a:t>HTML</a:t>
+            </a:r>
+            <a:endParaRPr lang="it-IT" dirty="0"/>
+          </a:p>
+        </p:txBody>
+      </p:sp>
+      <p:sp>
+        <p:nvSpPr>
+          <p:cNvPr id="54" name="TextBox 53">
+            <a:extLst>
+              <a:ext uri="{FF2B5EF4-FFF2-40B4-BE49-F238E27FC236}">
+                <a16:creationId xmlns:a16="http://schemas.microsoft.com/office/drawing/2014/main" id="{065E95BA-E358-084F-ADC5-2FDA91E489D2}"/>
+              </a:ext>
+            </a:extLst>
+          </p:cNvPr>
+          <p:cNvSpPr txBox="1"/>
+          <p:nvPr/>
+        </p:nvSpPr>
+        <p:spPr>
+          <a:xfrm>
+            <a:off x="5508194" y="3195221"/>
+            <a:ext cx="790962" cy="369332"/>
+          </a:xfrm>
+          <a:prstGeom prst="rect">
+            <a:avLst/>
+          </a:prstGeom>
+          <a:noFill/>
+        </p:spPr>
+        <p:txBody>
+          <a:bodyPr wrap="square" rtlCol="0">
+            <a:spAutoFit/>
+          </a:bodyPr>
+          <a:lstStyle/>
+          <a:p>
+            <a:r>
+              <a:rPr lang="en-US" dirty="0"/>
+              <a:t>HTML</a:t>
+            </a:r>
+            <a:endParaRPr lang="it-IT" dirty="0"/>
+          </a:p>
+        </p:txBody>
+      </p:sp>
+      <p:sp>
+        <p:nvSpPr>
+          <p:cNvPr id="68" name="TextBox 67">
+            <a:extLst>
+              <a:ext uri="{FF2B5EF4-FFF2-40B4-BE49-F238E27FC236}">
+                <a16:creationId xmlns:a16="http://schemas.microsoft.com/office/drawing/2014/main" id="{4A0D1C7F-7E30-BF40-A341-BC575F2BB456}"/>
+              </a:ext>
+            </a:extLst>
+          </p:cNvPr>
+          <p:cNvSpPr txBox="1"/>
+          <p:nvPr/>
+        </p:nvSpPr>
+        <p:spPr>
+          <a:xfrm>
+            <a:off x="7930308" y="4591691"/>
+            <a:ext cx="967891" cy="369332"/>
+          </a:xfrm>
+          <a:prstGeom prst="rect">
+            <a:avLst/>
+          </a:prstGeom>
+          <a:noFill/>
+        </p:spPr>
+        <p:txBody>
+          <a:bodyPr wrap="square" rtlCol="0">
+            <a:spAutoFit/>
+          </a:bodyPr>
+          <a:lstStyle/>
+          <a:p>
+            <a:r>
+              <a:rPr lang="en-US" dirty="0"/>
+              <a:t>MOCKs</a:t>
+            </a:r>
+            <a:endParaRPr lang="it-IT" dirty="0"/>
+          </a:p>
+        </p:txBody>
+      </p:sp>
+      <p:sp>
+        <p:nvSpPr>
+          <p:cNvPr id="87" name="Rounded Rectangle 86">
+            <a:extLst>
+              <a:ext uri="{FF2B5EF4-FFF2-40B4-BE49-F238E27FC236}">
+                <a16:creationId xmlns:a16="http://schemas.microsoft.com/office/drawing/2014/main" id="{E06F4D88-7D71-434A-A6C5-CFE3925EC9D4}"/>
+              </a:ext>
+            </a:extLst>
+          </p:cNvPr>
+          <p:cNvSpPr/>
+          <p:nvPr/>
+        </p:nvSpPr>
+        <p:spPr>
+          <a:xfrm>
+            <a:off x="10654580" y="1486282"/>
+            <a:ext cx="1041235" cy="700082"/>
+          </a:xfrm>
+          <a:prstGeom prst="roundRect">
+            <a:avLst/>
+          </a:prstGeom>
+          <a:solidFill>
+            <a:schemeClr val="bg2">
+              <a:lumMod val="90000"/>
+            </a:schemeClr>
+          </a:solidFill>
+          <a:ln w="25400">
+            <a:solidFill>
+              <a:schemeClr val="bg2">
+                <a:lumMod val="50000"/>
+              </a:schemeClr>
+            </a:solidFill>
+          </a:ln>
+        </p:spPr>
+        <p:style>
+          <a:lnRef idx="2">
+            <a:schemeClr val="accent1">
+              <a:shade val="50000"/>
+            </a:schemeClr>
+          </a:lnRef>
+          <a:fillRef idx="1">
+            <a:schemeClr val="accent1"/>
+          </a:fillRef>
+          <a:effectRef idx="0">
+            <a:schemeClr val="accent1"/>
+          </a:effectRef>
+          <a:fontRef idx="minor">
+            <a:schemeClr val="lt1"/>
+          </a:fontRef>
+        </p:style>
+        <p:txBody>
+          <a:bodyPr rtlCol="0" anchor="ctr"/>
+          <a:lstStyle/>
+          <a:p>
+            <a:pPr algn="ctr"/>
+            <a:r>
+              <a:rPr lang="en-US" dirty="0">
+                <a:solidFill>
+                  <a:schemeClr val="tx1"/>
+                </a:solidFill>
+              </a:rPr>
+              <a:t>DA</a:t>
+            </a:r>
+          </a:p>
+        </p:txBody>
+      </p:sp>
+      <p:sp>
+        <p:nvSpPr>
+          <p:cNvPr id="110" name="Rounded Rectangle 109">
+            <a:extLst>
+              <a:ext uri="{FF2B5EF4-FFF2-40B4-BE49-F238E27FC236}">
+                <a16:creationId xmlns:a16="http://schemas.microsoft.com/office/drawing/2014/main" id="{254AEA66-4E41-544C-BB02-8012E84DBA0F}"/>
+              </a:ext>
+            </a:extLst>
+          </p:cNvPr>
+          <p:cNvSpPr/>
+          <p:nvPr/>
+        </p:nvSpPr>
+        <p:spPr>
+          <a:xfrm>
+            <a:off x="10654583" y="4453945"/>
+            <a:ext cx="1041235" cy="669563"/>
+          </a:xfrm>
+          <a:prstGeom prst="roundRect">
+            <a:avLst/>
+          </a:prstGeom>
+          <a:solidFill>
+            <a:schemeClr val="bg2">
+              <a:lumMod val="90000"/>
+            </a:schemeClr>
+          </a:solidFill>
+          <a:ln w="25400">
+            <a:solidFill>
+              <a:schemeClr val="bg2">
+                <a:lumMod val="50000"/>
+              </a:schemeClr>
+            </a:solidFill>
+          </a:ln>
+        </p:spPr>
+        <p:style>
+          <a:lnRef idx="2">
+            <a:schemeClr val="accent1">
+              <a:shade val="50000"/>
+            </a:schemeClr>
+          </a:lnRef>
+          <a:fillRef idx="1">
+            <a:schemeClr val="accent1"/>
+          </a:fillRef>
+          <a:effectRef idx="0">
+            <a:schemeClr val="accent1"/>
+          </a:effectRef>
+          <a:fontRef idx="minor">
+            <a:schemeClr val="lt1"/>
+          </a:fontRef>
+        </p:style>
+        <p:txBody>
+          <a:bodyPr rtlCol="0" anchor="ctr"/>
+          <a:lstStyle/>
+          <a:p>
+            <a:pPr algn="ctr"/>
+            <a:r>
+              <a:rPr lang="en-US" dirty="0">
+                <a:solidFill>
+                  <a:schemeClr val="tx1"/>
+                </a:solidFill>
+              </a:rPr>
+              <a:t>LOC</a:t>
+            </a:r>
+            <a:endParaRPr lang="it-IT" dirty="0">
+              <a:solidFill>
+                <a:schemeClr val="tx1"/>
+              </a:solidFill>
+            </a:endParaRPr>
+          </a:p>
+        </p:txBody>
+      </p:sp>
+      <p:sp>
+        <p:nvSpPr>
+          <p:cNvPr id="111" name="Rounded Rectangle 110">
+            <a:extLst>
+              <a:ext uri="{FF2B5EF4-FFF2-40B4-BE49-F238E27FC236}">
+                <a16:creationId xmlns:a16="http://schemas.microsoft.com/office/drawing/2014/main" id="{E9F1CB7F-0274-6F4D-9C6E-5B0407F9FBFF}"/>
+              </a:ext>
+            </a:extLst>
+          </p:cNvPr>
+          <p:cNvSpPr/>
+          <p:nvPr/>
+        </p:nvSpPr>
+        <p:spPr>
+          <a:xfrm>
+            <a:off x="10654582" y="3448123"/>
+            <a:ext cx="1041235" cy="669563"/>
+          </a:xfrm>
+          <a:prstGeom prst="roundRect">
+            <a:avLst/>
+          </a:prstGeom>
+          <a:solidFill>
+            <a:schemeClr val="bg2">
+              <a:lumMod val="90000"/>
+            </a:schemeClr>
+          </a:solidFill>
+          <a:ln w="25400">
+            <a:solidFill>
+              <a:schemeClr val="bg2">
+                <a:lumMod val="50000"/>
+              </a:schemeClr>
+            </a:solidFill>
+          </a:ln>
+        </p:spPr>
+        <p:style>
+          <a:lnRef idx="2">
+            <a:schemeClr val="accent1">
+              <a:shade val="50000"/>
+            </a:schemeClr>
+          </a:lnRef>
+          <a:fillRef idx="1">
+            <a:schemeClr val="accent1"/>
+          </a:fillRef>
+          <a:effectRef idx="0">
+            <a:schemeClr val="accent1"/>
+          </a:effectRef>
+          <a:fontRef idx="minor">
+            <a:schemeClr val="lt1"/>
+          </a:fontRef>
+        </p:style>
+        <p:txBody>
+          <a:bodyPr rtlCol="0" anchor="ctr"/>
+          <a:lstStyle/>
+          <a:p>
+            <a:pPr algn="ctr"/>
+            <a:r>
+              <a:rPr lang="en-US" dirty="0">
+                <a:solidFill>
+                  <a:schemeClr val="tx1"/>
+                </a:solidFill>
+              </a:rPr>
+              <a:t>MVT</a:t>
+            </a:r>
+            <a:endParaRPr lang="it-IT" dirty="0">
+              <a:solidFill>
+                <a:schemeClr val="tx1"/>
+              </a:solidFill>
+            </a:endParaRPr>
+          </a:p>
+        </p:txBody>
+      </p:sp>
+      <p:sp>
+        <p:nvSpPr>
+          <p:cNvPr id="112" name="Rounded Rectangle 111">
+            <a:extLst>
+              <a:ext uri="{FF2B5EF4-FFF2-40B4-BE49-F238E27FC236}">
+                <a16:creationId xmlns:a16="http://schemas.microsoft.com/office/drawing/2014/main" id="{DFC91A64-62D9-AE47-A83D-5756628E96FF}"/>
+              </a:ext>
+            </a:extLst>
+          </p:cNvPr>
+          <p:cNvSpPr/>
+          <p:nvPr/>
+        </p:nvSpPr>
+        <p:spPr>
+          <a:xfrm>
+            <a:off x="10654581" y="5465561"/>
+            <a:ext cx="1041235" cy="669563"/>
+          </a:xfrm>
+          <a:prstGeom prst="roundRect">
+            <a:avLst/>
+          </a:prstGeom>
+          <a:solidFill>
+            <a:schemeClr val="bg2">
+              <a:lumMod val="90000"/>
+            </a:schemeClr>
+          </a:solidFill>
+          <a:ln w="25400">
+            <a:solidFill>
+              <a:schemeClr val="bg2">
+                <a:lumMod val="50000"/>
+              </a:schemeClr>
+            </a:solidFill>
+          </a:ln>
+        </p:spPr>
+        <p:style>
+          <a:lnRef idx="2">
+            <a:schemeClr val="accent1">
+              <a:shade val="50000"/>
+            </a:schemeClr>
+          </a:lnRef>
+          <a:fillRef idx="1">
+            <a:schemeClr val="accent1"/>
+          </a:fillRef>
+          <a:effectRef idx="0">
+            <a:schemeClr val="accent1"/>
+          </a:effectRef>
+          <a:fontRef idx="minor">
+            <a:schemeClr val="lt1"/>
+          </a:fontRef>
+        </p:style>
+        <p:txBody>
+          <a:bodyPr rtlCol="0" anchor="ctr"/>
+          <a:lstStyle/>
+          <a:p>
+            <a:pPr algn="ctr"/>
+            <a:r>
+              <a:rPr lang="en-US" dirty="0">
+                <a:solidFill>
+                  <a:schemeClr val="tx1"/>
+                </a:solidFill>
+              </a:rPr>
+              <a:t>…</a:t>
+            </a:r>
+            <a:endParaRPr lang="it-IT" dirty="0">
+              <a:solidFill>
+                <a:schemeClr val="tx1"/>
+              </a:solidFill>
+            </a:endParaRPr>
+          </a:p>
+        </p:txBody>
+      </p:sp>
+      <p:cxnSp>
+        <p:nvCxnSpPr>
+          <p:cNvPr id="113" name="Straight Connector 112">
+            <a:extLst>
+              <a:ext uri="{FF2B5EF4-FFF2-40B4-BE49-F238E27FC236}">
+                <a16:creationId xmlns:a16="http://schemas.microsoft.com/office/drawing/2014/main" id="{FBBE1CDF-A093-6C4F-828E-B68493D8E490}"/>
+              </a:ext>
+            </a:extLst>
+          </p:cNvPr>
+          <p:cNvCxnSpPr>
+            <a:cxnSpLocks/>
+            <a:stCxn id="11" idx="3"/>
+          </p:cNvCxnSpPr>
+          <p:nvPr/>
+        </p:nvCxnSpPr>
+        <p:spPr>
+          <a:xfrm>
+            <a:off x="9003845" y="3549308"/>
+            <a:ext cx="1501122" cy="0"/>
+          </a:xfrm>
+          <a:prstGeom prst="line">
+            <a:avLst/>
+          </a:prstGeom>
+          <a:ln>
+            <a:solidFill>
+              <a:schemeClr val="tx1"/>
+            </a:solidFill>
+            <a:headEnd type="triangle" w="lg" len="lg"/>
+            <a:tailEnd type="triangle" w="lg" len="lg"/>
+          </a:ln>
+        </p:spPr>
+        <p:style>
+          <a:lnRef idx="1">
+            <a:schemeClr val="accent1"/>
+          </a:lnRef>
+          <a:fillRef idx="0">
+            <a:schemeClr val="accent1"/>
+          </a:fillRef>
+          <a:effectRef idx="0">
+            <a:schemeClr val="accent1"/>
+          </a:effectRef>
+          <a:fontRef idx="minor">
+            <a:schemeClr val="tx1"/>
+          </a:fontRef>
+        </p:style>
+      </p:cxnSp>
+      <p:cxnSp>
+        <p:nvCxnSpPr>
+          <p:cNvPr id="143" name="Straight Connector 142">
+            <a:extLst>
+              <a:ext uri="{FF2B5EF4-FFF2-40B4-BE49-F238E27FC236}">
+                <a16:creationId xmlns:a16="http://schemas.microsoft.com/office/drawing/2014/main" id="{79530A06-AC42-7444-ADB8-895497A3FDCF}"/>
+              </a:ext>
+            </a:extLst>
+          </p:cNvPr>
+          <p:cNvCxnSpPr>
+            <a:cxnSpLocks/>
+          </p:cNvCxnSpPr>
+          <p:nvPr/>
+        </p:nvCxnSpPr>
+        <p:spPr>
           <a:xfrm flipV="1">
-            <a:off x="6921466" y="3059353"/>
-            <a:ext cx="1085502" cy="495981"/>
+            <a:off x="9006450" y="1986627"/>
+            <a:ext cx="1625997" cy="1210025"/>
           </a:xfrm>
           <a:prstGeom prst="line">
             <a:avLst/>
@@ -4786,7 +6145,7 @@
         </p:nvSpPr>
         <p:spPr>
           <a:xfrm>
-            <a:off x="7215604" y="2505815"/>
+            <a:off x="9528290" y="1554973"/>
             <a:ext cx="790962" cy="369332"/>
           </a:xfrm>
           <a:prstGeom prst="rect">
@@ -4805,6 +6164,89 @@
               <a:t>JS/CSS</a:t>
             </a:r>
             <a:endParaRPr lang="it-IT" dirty="0"/>
+          </a:p>
+        </p:txBody>
+      </p:sp>
+      <p:sp>
+        <p:nvSpPr>
+          <p:cNvPr id="44" name="Rounded Rectangle 43">
+            <a:extLst>
+              <a:ext uri="{FF2B5EF4-FFF2-40B4-BE49-F238E27FC236}">
+                <a16:creationId xmlns:a16="http://schemas.microsoft.com/office/drawing/2014/main" id="{A5E3B5CE-1CBE-6E48-B3AA-79774C7829B3}"/>
+              </a:ext>
+            </a:extLst>
+          </p:cNvPr>
+          <p:cNvSpPr/>
+          <p:nvPr/>
+        </p:nvSpPr>
+        <p:spPr>
+          <a:xfrm>
+            <a:off x="6943645" y="2919420"/>
+            <a:ext cx="729717" cy="1250909"/>
+          </a:xfrm>
+          <a:prstGeom prst="roundRect">
+            <a:avLst/>
+          </a:prstGeom>
+          <a:solidFill>
+            <a:schemeClr val="accent5">
+              <a:lumMod val="20000"/>
+              <a:lumOff val="80000"/>
+            </a:schemeClr>
+          </a:solidFill>
+          <a:ln w="25400">
+            <a:solidFill>
+              <a:schemeClr val="accent1">
+                <a:lumMod val="60000"/>
+                <a:lumOff val="40000"/>
+              </a:schemeClr>
+            </a:solidFill>
+          </a:ln>
+        </p:spPr>
+        <p:style>
+          <a:lnRef idx="2">
+            <a:schemeClr val="accent1">
+              <a:shade val="50000"/>
+            </a:schemeClr>
+          </a:lnRef>
+          <a:fillRef idx="1">
+            <a:schemeClr val="accent1"/>
+          </a:fillRef>
+          <a:effectRef idx="0">
+            <a:schemeClr val="accent1"/>
+          </a:effectRef>
+          <a:fontRef idx="minor">
+            <a:schemeClr val="lt1"/>
+          </a:fontRef>
+        </p:style>
+        <p:txBody>
+          <a:bodyPr rtlCol="0" anchor="ctr"/>
+          <a:lstStyle/>
+          <a:p>
+            <a:pPr algn="ctr"/>
+            <a:r>
+              <a:rPr lang="en-US" sz="1200" dirty="0">
+                <a:solidFill>
+                  <a:schemeClr val="tx1"/>
+                </a:solidFill>
+              </a:rPr>
+              <a:t>DIO</a:t>
+            </a:r>
+          </a:p>
+          <a:p>
+            <a:pPr algn="ctr"/>
+            <a:r>
+              <a:rPr lang="en-US" sz="1200" dirty="0">
+                <a:solidFill>
+                  <a:schemeClr val="tx1"/>
+                </a:solidFill>
+              </a:rPr>
+              <a:t>PLUGIN</a:t>
+            </a:r>
+            <a:endParaRPr lang="it-IT" sz="1200" dirty="0">
+              <a:solidFill>
+                <a:schemeClr val="tx1"/>
+              </a:solidFill>
+            </a:endParaRPr>
           </a:p>
         </p:txBody>
       </p:sp>

</xml_diff>